<commit_message>
update last week's & add this week's
</commit_message>
<xml_diff>
--- a/weekly_dashboard/dashboard-04-20.pptx
+++ b/weekly_dashboard/dashboard-04-20.pptx
@@ -5,12 +5,13 @@
     <p:sldMasterId id="2147483648" r:id="rId1"/>
   </p:sldMasterIdLst>
   <p:notesMasterIdLst>
-    <p:notesMasterId r:id="rId5"/>
+    <p:notesMasterId r:id="rId6"/>
   </p:notesMasterIdLst>
   <p:sldIdLst>
     <p:sldId id="257" r:id="rId2"/>
-    <p:sldId id="256" r:id="rId3"/>
-    <p:sldId id="258" r:id="rId4"/>
+    <p:sldId id="258" r:id="rId3"/>
+    <p:sldId id="256" r:id="rId4"/>
+    <p:sldId id="259" r:id="rId5"/>
   </p:sldIdLst>
   <p:sldSz cx="12192000" cy="6858000"/>
   <p:notesSz cx="6858000" cy="9144000"/>
@@ -210,7 +211,7 @@
           <a:p>
             <a:fld id="{6B5ADEEA-2554-3649-A5FC-F8BE9CAFE9B8}" type="datetimeFigureOut">
               <a:rPr lang="en-US" smtClean="0"/>
-              <a:t>4/19/2018</a:t>
+              <a:t>4/20/2018</a:t>
             </a:fld>
             <a:endParaRPr lang="en-US"/>
           </a:p>
@@ -573,6 +574,90 @@
 </p:notes>
 </file>
 
+<file path=ppt/notesSlides/notesSlide2.xml><?xml version="1.0" encoding="utf-8"?>
+<p:notes xmlns:a="http://schemas.openxmlformats.org/drawingml/2006/main" xmlns:r="http://schemas.openxmlformats.org/officeDocument/2006/relationships" xmlns:p="http://schemas.openxmlformats.org/presentationml/2006/main">
+  <p:cSld>
+    <p:spTree>
+      <p:nvGrpSpPr>
+        <p:cNvPr id="1" name=""/>
+        <p:cNvGrpSpPr/>
+        <p:nvPr/>
+      </p:nvGrpSpPr>
+      <p:grpSpPr>
+        <a:xfrm>
+          <a:off x="0" y="0"/>
+          <a:ext cx="0" cy="0"/>
+          <a:chOff x="0" y="0"/>
+          <a:chExt cx="0" cy="0"/>
+        </a:xfrm>
+      </p:grpSpPr>
+      <p:sp>
+        <p:nvSpPr>
+          <p:cNvPr id="2" name="Slide Image Placeholder 1"/>
+          <p:cNvSpPr>
+            <a:spLocks noGrp="1" noRot="1" noChangeAspect="1"/>
+          </p:cNvSpPr>
+          <p:nvPr>
+            <p:ph type="sldImg"/>
+          </p:nvPr>
+        </p:nvSpPr>
+        <p:spPr/>
+      </p:sp>
+      <p:sp>
+        <p:nvSpPr>
+          <p:cNvPr id="3" name="Notes Placeholder 2"/>
+          <p:cNvSpPr>
+            <a:spLocks noGrp="1"/>
+          </p:cNvSpPr>
+          <p:nvPr>
+            <p:ph type="body" idx="1"/>
+          </p:nvPr>
+        </p:nvSpPr>
+        <p:spPr/>
+        <p:txBody>
+          <a:bodyPr/>
+          <a:lstStyle/>
+          <a:p>
+            <a:endParaRPr lang="en-US" dirty="0"/>
+          </a:p>
+        </p:txBody>
+      </p:sp>
+      <p:sp>
+        <p:nvSpPr>
+          <p:cNvPr id="4" name="Slide Number Placeholder 3"/>
+          <p:cNvSpPr>
+            <a:spLocks noGrp="1"/>
+          </p:cNvSpPr>
+          <p:nvPr>
+            <p:ph type="sldNum" sz="quarter" idx="10"/>
+          </p:nvPr>
+        </p:nvSpPr>
+        <p:spPr/>
+        <p:txBody>
+          <a:bodyPr/>
+          <a:lstStyle/>
+          <a:p>
+            <a:fld id="{9B6EA536-0A02-024A-865C-9746DE76D2ED}" type="slidenum">
+              <a:rPr lang="en-US" smtClean="0"/>
+              <a:t>4</a:t>
+            </a:fld>
+            <a:endParaRPr lang="en-US"/>
+          </a:p>
+        </p:txBody>
+      </p:sp>
+    </p:spTree>
+    <p:extLst>
+      <p:ext uri="{BB962C8B-B14F-4D97-AF65-F5344CB8AC3E}">
+        <p14:creationId xmlns:p14="http://schemas.microsoft.com/office/powerpoint/2010/main" val="3245073246"/>
+      </p:ext>
+    </p:extLst>
+  </p:cSld>
+  <p:clrMapOvr>
+    <a:masterClrMapping/>
+  </p:clrMapOvr>
+</p:notes>
+</file>
+
 <file path=ppt/slideLayouts/slideLayout1.xml><?xml version="1.0" encoding="utf-8"?>
 <p:sldLayout xmlns:a="http://schemas.openxmlformats.org/drawingml/2006/main" xmlns:r="http://schemas.openxmlformats.org/officeDocument/2006/relationships" xmlns:p="http://schemas.openxmlformats.org/presentationml/2006/main" type="title" preserve="1">
   <p:cSld name="Title Slide">
@@ -702,7 +787,7 @@
           <a:p>
             <a:fld id="{B8394864-8E61-46E1-AE6F-DC9B03139954}" type="datetimeFigureOut">
               <a:rPr lang="en-US" smtClean="0"/>
-              <a:t>4/19/2018</a:t>
+              <a:t>4/20/2018</a:t>
             </a:fld>
             <a:endParaRPr lang="en-US"/>
           </a:p>
@@ -870,7 +955,7 @@
           <a:p>
             <a:fld id="{B8394864-8E61-46E1-AE6F-DC9B03139954}" type="datetimeFigureOut">
               <a:rPr lang="en-US" smtClean="0"/>
-              <a:t>4/19/2018</a:t>
+              <a:t>4/20/2018</a:t>
             </a:fld>
             <a:endParaRPr lang="en-US"/>
           </a:p>
@@ -1048,7 +1133,7 @@
           <a:p>
             <a:fld id="{B8394864-8E61-46E1-AE6F-DC9B03139954}" type="datetimeFigureOut">
               <a:rPr lang="en-US" smtClean="0"/>
-              <a:t>4/19/2018</a:t>
+              <a:t>4/20/2018</a:t>
             </a:fld>
             <a:endParaRPr lang="en-US"/>
           </a:p>
@@ -1216,7 +1301,7 @@
           <a:p>
             <a:fld id="{B8394864-8E61-46E1-AE6F-DC9B03139954}" type="datetimeFigureOut">
               <a:rPr lang="en-US" smtClean="0"/>
-              <a:t>4/19/2018</a:t>
+              <a:t>4/20/2018</a:t>
             </a:fld>
             <a:endParaRPr lang="en-US"/>
           </a:p>
@@ -1461,7 +1546,7 @@
           <a:p>
             <a:fld id="{B8394864-8E61-46E1-AE6F-DC9B03139954}" type="datetimeFigureOut">
               <a:rPr lang="en-US" smtClean="0"/>
-              <a:t>4/19/2018</a:t>
+              <a:t>4/20/2018</a:t>
             </a:fld>
             <a:endParaRPr lang="en-US"/>
           </a:p>
@@ -1690,7 +1775,7 @@
           <a:p>
             <a:fld id="{B8394864-8E61-46E1-AE6F-DC9B03139954}" type="datetimeFigureOut">
               <a:rPr lang="en-US" smtClean="0"/>
-              <a:t>4/19/2018</a:t>
+              <a:t>4/20/2018</a:t>
             </a:fld>
             <a:endParaRPr lang="en-US"/>
           </a:p>
@@ -2054,7 +2139,7 @@
           <a:p>
             <a:fld id="{B8394864-8E61-46E1-AE6F-DC9B03139954}" type="datetimeFigureOut">
               <a:rPr lang="en-US" smtClean="0"/>
-              <a:t>4/19/2018</a:t>
+              <a:t>4/20/2018</a:t>
             </a:fld>
             <a:endParaRPr lang="en-US"/>
           </a:p>
@@ -2171,7 +2256,7 @@
           <a:p>
             <a:fld id="{B8394864-8E61-46E1-AE6F-DC9B03139954}" type="datetimeFigureOut">
               <a:rPr lang="en-US" smtClean="0"/>
-              <a:t>4/19/2018</a:t>
+              <a:t>4/20/2018</a:t>
             </a:fld>
             <a:endParaRPr lang="en-US"/>
           </a:p>
@@ -2266,7 +2351,7 @@
           <a:p>
             <a:fld id="{B8394864-8E61-46E1-AE6F-DC9B03139954}" type="datetimeFigureOut">
               <a:rPr lang="en-US" smtClean="0"/>
-              <a:t>4/19/2018</a:t>
+              <a:t>4/20/2018</a:t>
             </a:fld>
             <a:endParaRPr lang="en-US"/>
           </a:p>
@@ -2541,7 +2626,7 @@
           <a:p>
             <a:fld id="{B8394864-8E61-46E1-AE6F-DC9B03139954}" type="datetimeFigureOut">
               <a:rPr lang="en-US" smtClean="0"/>
-              <a:t>4/19/2018</a:t>
+              <a:t>4/20/2018</a:t>
             </a:fld>
             <a:endParaRPr lang="en-US"/>
           </a:p>
@@ -2793,7 +2878,7 @@
           <a:p>
             <a:fld id="{B8394864-8E61-46E1-AE6F-DC9B03139954}" type="datetimeFigureOut">
               <a:rPr lang="en-US" smtClean="0"/>
-              <a:t>4/19/2018</a:t>
+              <a:t>4/20/2018</a:t>
             </a:fld>
             <a:endParaRPr lang="en-US"/>
           </a:p>
@@ -3004,7 +3089,7 @@
           <a:p>
             <a:fld id="{B8394864-8E61-46E1-AE6F-DC9B03139954}" type="datetimeFigureOut">
               <a:rPr lang="en-US" smtClean="0"/>
-              <a:t>4/19/2018</a:t>
+              <a:t>4/20/2018</a:t>
             </a:fld>
             <a:endParaRPr lang="en-US"/>
           </a:p>
@@ -4079,7 +4164,7 @@
             </a:pPr>
             <a:r>
               <a:rPr lang="en-US" dirty="0"/>
-              <a:t>Create mock SIP client and make calls</a:t>
+              <a:t>Use SIP client to make calls</a:t>
             </a:r>
           </a:p>
         </p:txBody>
@@ -4129,6 +4214,1211 @@
 </file>
 
 <file path=ppt/slides/slide2.xml><?xml version="1.0" encoding="utf-8"?>
+<p:sld xmlns:a="http://schemas.openxmlformats.org/drawingml/2006/main" xmlns:r="http://schemas.openxmlformats.org/officeDocument/2006/relationships" xmlns:p="http://schemas.openxmlformats.org/presentationml/2006/main">
+  <p:cSld>
+    <p:spTree>
+      <p:nvGrpSpPr>
+        <p:cNvPr id="1" name=""/>
+        <p:cNvGrpSpPr/>
+        <p:nvPr/>
+      </p:nvGrpSpPr>
+      <p:grpSpPr>
+        <a:xfrm>
+          <a:off x="0" y="0"/>
+          <a:ext cx="0" cy="0"/>
+          <a:chOff x="0" y="0"/>
+          <a:chExt cx="0" cy="0"/>
+        </a:xfrm>
+      </p:grpSpPr>
+      <p:grpSp>
+        <p:nvGrpSpPr>
+          <p:cNvPr id="27" name="Group 26">
+            <a:extLst>
+              <a:ext uri="{FF2B5EF4-FFF2-40B4-BE49-F238E27FC236}">
+                <a16:creationId xmlns:a16="http://schemas.microsoft.com/office/drawing/2014/main" id="{640919FC-2550-4AA6-AB87-5D070B03AACE}"/>
+              </a:ext>
+            </a:extLst>
+          </p:cNvPr>
+          <p:cNvGrpSpPr/>
+          <p:nvPr/>
+        </p:nvGrpSpPr>
+        <p:grpSpPr>
+          <a:xfrm>
+            <a:off x="6858000" y="3103657"/>
+            <a:ext cx="2133600" cy="1370181"/>
+            <a:chOff x="6393795" y="3407155"/>
+            <a:chExt cx="2133600" cy="1370181"/>
+          </a:xfrm>
+        </p:grpSpPr>
+        <p:pic>
+          <p:nvPicPr>
+            <p:cNvPr id="26" name="Picture 25">
+              <a:extLst>
+                <a:ext uri="{FF2B5EF4-FFF2-40B4-BE49-F238E27FC236}">
+                  <a16:creationId xmlns:a16="http://schemas.microsoft.com/office/drawing/2014/main" id="{6A33C62D-5BB1-4041-B4C2-EA7584D3EA3D}"/>
+                </a:ext>
+              </a:extLst>
+            </p:cNvPr>
+            <p:cNvPicPr>
+              <a:picLocks noChangeAspect="1"/>
+            </p:cNvPicPr>
+            <p:nvPr/>
+          </p:nvPicPr>
+          <p:blipFill>
+            <a:blip r:embed="rId2" cstate="print">
+              <a:extLst>
+                <a:ext uri="{28A0092B-C50C-407E-A947-70E740481C1C}">
+                  <a14:useLocalDpi xmlns:a14="http://schemas.microsoft.com/office/drawing/2010/main" val="0"/>
+                </a:ext>
+              </a:extLst>
+            </a:blip>
+            <a:stretch>
+              <a:fillRect/>
+            </a:stretch>
+          </p:blipFill>
+          <p:spPr>
+            <a:xfrm>
+              <a:off x="6629400" y="4267200"/>
+              <a:ext cx="1662391" cy="510136"/>
+            </a:xfrm>
+            <a:prstGeom prst="rect">
+              <a:avLst/>
+            </a:prstGeom>
+          </p:spPr>
+        </p:pic>
+        <p:sp>
+          <p:nvSpPr>
+            <p:cNvPr id="7" name="Rectangle 6">
+              <a:extLst>
+                <a:ext uri="{FF2B5EF4-FFF2-40B4-BE49-F238E27FC236}">
+                  <a16:creationId xmlns:a16="http://schemas.microsoft.com/office/drawing/2014/main" id="{9964B77B-5845-4C64-86DF-8E42AAD312FF}"/>
+                </a:ext>
+              </a:extLst>
+            </p:cNvPr>
+            <p:cNvSpPr/>
+            <p:nvPr/>
+          </p:nvSpPr>
+          <p:spPr>
+            <a:xfrm>
+              <a:off x="6393795" y="3407155"/>
+              <a:ext cx="2133600" cy="914400"/>
+            </a:xfrm>
+            <a:prstGeom prst="rect">
+              <a:avLst/>
+            </a:prstGeom>
+          </p:spPr>
+          <p:style>
+            <a:lnRef idx="2">
+              <a:schemeClr val="accent1">
+                <a:shade val="50000"/>
+              </a:schemeClr>
+            </a:lnRef>
+            <a:fillRef idx="1">
+              <a:schemeClr val="accent1"/>
+            </a:fillRef>
+            <a:effectRef idx="0">
+              <a:schemeClr val="accent1"/>
+            </a:effectRef>
+            <a:fontRef idx="minor">
+              <a:schemeClr val="lt1"/>
+            </a:fontRef>
+          </p:style>
+          <p:txBody>
+            <a:bodyPr rtlCol="0" anchor="ctr"/>
+            <a:lstStyle/>
+            <a:p>
+              <a:pPr algn="ctr"/>
+              <a:r>
+                <a:rPr lang="en-US" dirty="0">
+                  <a:latin typeface="Century Gothic" panose="020B0502020202020204" pitchFamily="34" charset="0"/>
+                </a:rPr>
+                <a:t>Cisco NAM</a:t>
+              </a:r>
+            </a:p>
+          </p:txBody>
+        </p:sp>
+      </p:grpSp>
+      <p:sp>
+        <p:nvSpPr>
+          <p:cNvPr id="2" name="Title 1">
+            <a:extLst>
+              <a:ext uri="{FF2B5EF4-FFF2-40B4-BE49-F238E27FC236}">
+                <a16:creationId xmlns:a16="http://schemas.microsoft.com/office/drawing/2014/main" id="{F819E63E-530C-449E-AB16-6CDAB959E06D}"/>
+              </a:ext>
+            </a:extLst>
+          </p:cNvPr>
+          <p:cNvSpPr>
+            <a:spLocks noGrp="1"/>
+          </p:cNvSpPr>
+          <p:nvPr>
+            <p:ph type="title"/>
+          </p:nvPr>
+        </p:nvSpPr>
+        <p:spPr>
+          <a:xfrm>
+            <a:off x="752491" y="-28241"/>
+            <a:ext cx="10515600" cy="1325563"/>
+          </a:xfrm>
+        </p:spPr>
+        <p:txBody>
+          <a:bodyPr/>
+          <a:lstStyle/>
+          <a:p>
+            <a:r>
+              <a:rPr lang="en-US" dirty="0">
+                <a:latin typeface="Century Gothic" panose="020B0502020202020204" pitchFamily="34" charset="0"/>
+              </a:rPr>
+              <a:t>Test Environment Setup</a:t>
+            </a:r>
+          </a:p>
+        </p:txBody>
+      </p:sp>
+      <p:grpSp>
+        <p:nvGrpSpPr>
+          <p:cNvPr id="24" name="Group 23">
+            <a:extLst>
+              <a:ext uri="{FF2B5EF4-FFF2-40B4-BE49-F238E27FC236}">
+                <a16:creationId xmlns:a16="http://schemas.microsoft.com/office/drawing/2014/main" id="{78D1483E-97F2-4731-8597-C2A12C8E16B1}"/>
+              </a:ext>
+            </a:extLst>
+          </p:cNvPr>
+          <p:cNvGrpSpPr/>
+          <p:nvPr/>
+        </p:nvGrpSpPr>
+        <p:grpSpPr>
+          <a:xfrm>
+            <a:off x="3591487" y="3146700"/>
+            <a:ext cx="1742513" cy="1299525"/>
+            <a:chOff x="3732868" y="3424875"/>
+            <a:chExt cx="1742513" cy="1299525"/>
+          </a:xfrm>
+        </p:grpSpPr>
+        <p:pic>
+          <p:nvPicPr>
+            <p:cNvPr id="23" name="Graphic 22" descr="Wireless router">
+              <a:extLst>
+                <a:ext uri="{FF2B5EF4-FFF2-40B4-BE49-F238E27FC236}">
+                  <a16:creationId xmlns:a16="http://schemas.microsoft.com/office/drawing/2014/main" id="{A529D04E-F3E6-40ED-B966-306E2D044AA5}"/>
+                </a:ext>
+              </a:extLst>
+            </p:cNvPr>
+            <p:cNvPicPr>
+              <a:picLocks noChangeAspect="1"/>
+            </p:cNvPicPr>
+            <p:nvPr/>
+          </p:nvPicPr>
+          <p:blipFill>
+            <a:blip r:embed="rId3">
+              <a:extLst>
+                <a:ext uri="{28A0092B-C50C-407E-A947-70E740481C1C}">
+                  <a14:useLocalDpi xmlns:a14="http://schemas.microsoft.com/office/drawing/2010/main" val="0"/>
+                </a:ext>
+                <a:ext uri="{96DAC541-7B7A-43D3-8B79-37D633B846F1}">
+                  <asvg:svgBlip xmlns:asvg="http://schemas.microsoft.com/office/drawing/2016/SVG/main" r:embed="rId4"/>
+                </a:ext>
+              </a:extLst>
+            </a:blip>
+            <a:stretch>
+              <a:fillRect/>
+            </a:stretch>
+          </p:blipFill>
+          <p:spPr>
+            <a:xfrm>
+              <a:off x="4114800" y="3810000"/>
+              <a:ext cx="914400" cy="914400"/>
+            </a:xfrm>
+            <a:prstGeom prst="rect">
+              <a:avLst/>
+            </a:prstGeom>
+          </p:spPr>
+        </p:pic>
+        <p:sp>
+          <p:nvSpPr>
+            <p:cNvPr id="6" name="Rectangle 5">
+              <a:extLst>
+                <a:ext uri="{FF2B5EF4-FFF2-40B4-BE49-F238E27FC236}">
+                  <a16:creationId xmlns:a16="http://schemas.microsoft.com/office/drawing/2014/main" id="{3D04F8A0-26AC-4A65-BEF2-A22D913BF4E1}"/>
+                </a:ext>
+              </a:extLst>
+            </p:cNvPr>
+            <p:cNvSpPr/>
+            <p:nvPr/>
+          </p:nvSpPr>
+          <p:spPr>
+            <a:xfrm>
+              <a:off x="3732868" y="3424875"/>
+              <a:ext cx="1742513" cy="994725"/>
+            </a:xfrm>
+            <a:prstGeom prst="rect">
+              <a:avLst/>
+            </a:prstGeom>
+          </p:spPr>
+          <p:style>
+            <a:lnRef idx="2">
+              <a:schemeClr val="accent1">
+                <a:shade val="50000"/>
+              </a:schemeClr>
+            </a:lnRef>
+            <a:fillRef idx="1">
+              <a:schemeClr val="accent1"/>
+            </a:fillRef>
+            <a:effectRef idx="0">
+              <a:schemeClr val="accent1"/>
+            </a:effectRef>
+            <a:fontRef idx="minor">
+              <a:schemeClr val="lt1"/>
+            </a:fontRef>
+          </p:style>
+          <p:txBody>
+            <a:bodyPr rtlCol="0" anchor="ctr"/>
+            <a:lstStyle/>
+            <a:p>
+              <a:pPr algn="ctr"/>
+              <a:r>
+                <a:rPr lang="en-US" dirty="0">
+                  <a:latin typeface="Century Gothic" panose="020B0502020202020204" pitchFamily="34" charset="0"/>
+                </a:rPr>
+                <a:t>Netgear Switch</a:t>
+              </a:r>
+            </a:p>
+          </p:txBody>
+        </p:sp>
+      </p:grpSp>
+      <p:sp>
+        <p:nvSpPr>
+          <p:cNvPr id="9" name="Cloud 8">
+            <a:extLst>
+              <a:ext uri="{FF2B5EF4-FFF2-40B4-BE49-F238E27FC236}">
+                <a16:creationId xmlns:a16="http://schemas.microsoft.com/office/drawing/2014/main" id="{38A7790E-A337-4B01-97BF-1E09319975BA}"/>
+              </a:ext>
+            </a:extLst>
+          </p:cNvPr>
+          <p:cNvSpPr/>
+          <p:nvPr/>
+        </p:nvSpPr>
+        <p:spPr>
+          <a:xfrm>
+            <a:off x="9867900" y="4267200"/>
+            <a:ext cx="2171700" cy="1295400"/>
+          </a:xfrm>
+          <a:prstGeom prst="cloud">
+            <a:avLst/>
+          </a:prstGeom>
+        </p:spPr>
+        <p:style>
+          <a:lnRef idx="2">
+            <a:schemeClr val="accent1">
+              <a:shade val="50000"/>
+            </a:schemeClr>
+          </a:lnRef>
+          <a:fillRef idx="1">
+            <a:schemeClr val="accent1"/>
+          </a:fillRef>
+          <a:effectRef idx="0">
+            <a:schemeClr val="accent1"/>
+          </a:effectRef>
+          <a:fontRef idx="minor">
+            <a:schemeClr val="lt1"/>
+          </a:fontRef>
+        </p:style>
+        <p:txBody>
+          <a:bodyPr rtlCol="0" anchor="b"/>
+          <a:lstStyle/>
+          <a:p>
+            <a:pPr algn="ctr"/>
+            <a:r>
+              <a:rPr lang="en-US" dirty="0">
+                <a:latin typeface="Century Gothic" panose="020B0502020202020204" pitchFamily="34" charset="0"/>
+              </a:rPr>
+              <a:t>UC Davis VoIP WAN</a:t>
+            </a:r>
+          </a:p>
+        </p:txBody>
+      </p:sp>
+      <p:grpSp>
+        <p:nvGrpSpPr>
+          <p:cNvPr id="14" name="Group 13">
+            <a:extLst>
+              <a:ext uri="{FF2B5EF4-FFF2-40B4-BE49-F238E27FC236}">
+                <a16:creationId xmlns:a16="http://schemas.microsoft.com/office/drawing/2014/main" id="{49FF96DF-F739-4EEB-B773-0F1EB1F56AB7}"/>
+              </a:ext>
+            </a:extLst>
+          </p:cNvPr>
+          <p:cNvGrpSpPr/>
+          <p:nvPr/>
+        </p:nvGrpSpPr>
+        <p:grpSpPr>
+          <a:xfrm>
+            <a:off x="850526" y="1524000"/>
+            <a:ext cx="1174376" cy="1566193"/>
+            <a:chOff x="1355912" y="1720719"/>
+            <a:chExt cx="1174376" cy="1566193"/>
+          </a:xfrm>
+        </p:grpSpPr>
+        <p:sp>
+          <p:nvSpPr>
+            <p:cNvPr id="3" name="Rectangle 2">
+              <a:extLst>
+                <a:ext uri="{FF2B5EF4-FFF2-40B4-BE49-F238E27FC236}">
+                  <a16:creationId xmlns:a16="http://schemas.microsoft.com/office/drawing/2014/main" id="{1561D112-DECB-4165-844C-0B9A6B5816F9}"/>
+                </a:ext>
+              </a:extLst>
+            </p:cNvPr>
+            <p:cNvSpPr/>
+            <p:nvPr/>
+          </p:nvSpPr>
+          <p:spPr>
+            <a:xfrm>
+              <a:off x="1355912" y="1720719"/>
+              <a:ext cx="1174376" cy="1197238"/>
+            </a:xfrm>
+            <a:prstGeom prst="rect">
+              <a:avLst/>
+            </a:prstGeom>
+          </p:spPr>
+          <p:style>
+            <a:lnRef idx="2">
+              <a:schemeClr val="accent1">
+                <a:shade val="50000"/>
+              </a:schemeClr>
+            </a:lnRef>
+            <a:fillRef idx="1">
+              <a:schemeClr val="accent1"/>
+            </a:fillRef>
+            <a:effectRef idx="0">
+              <a:schemeClr val="accent1"/>
+            </a:effectRef>
+            <a:fontRef idx="minor">
+              <a:schemeClr val="lt1"/>
+            </a:fontRef>
+          </p:style>
+          <p:txBody>
+            <a:bodyPr rtlCol="0" anchor="ctr"/>
+            <a:lstStyle/>
+            <a:p>
+              <a:pPr algn="ctr"/>
+              <a:r>
+                <a:rPr lang="en-US" dirty="0">
+                  <a:latin typeface="Century Gothic" panose="020B0502020202020204" pitchFamily="34" charset="0"/>
+                </a:rPr>
+                <a:t>Cisco Phone</a:t>
+              </a:r>
+            </a:p>
+            <a:p>
+              <a:pPr algn="ctr"/>
+              <a:endParaRPr lang="en-US" dirty="0">
+                <a:latin typeface="Century Gothic" panose="020B0502020202020204" pitchFamily="34" charset="0"/>
+              </a:endParaRPr>
+            </a:p>
+          </p:txBody>
+        </p:sp>
+        <p:pic>
+          <p:nvPicPr>
+            <p:cNvPr id="11" name="Graphic 10" descr="Telephone">
+              <a:extLst>
+                <a:ext uri="{FF2B5EF4-FFF2-40B4-BE49-F238E27FC236}">
+                  <a16:creationId xmlns:a16="http://schemas.microsoft.com/office/drawing/2014/main" id="{E4D2B0E5-CDF4-4CAE-AA8C-5825739BDB85}"/>
+                </a:ext>
+              </a:extLst>
+            </p:cNvPr>
+            <p:cNvPicPr>
+              <a:picLocks noChangeAspect="1"/>
+            </p:cNvPicPr>
+            <p:nvPr/>
+          </p:nvPicPr>
+          <p:blipFill>
+            <a:blip r:embed="rId5">
+              <a:extLst>
+                <a:ext uri="{28A0092B-C50C-407E-A947-70E740481C1C}">
+                  <a14:useLocalDpi xmlns:a14="http://schemas.microsoft.com/office/drawing/2010/main" val="0"/>
+                </a:ext>
+                <a:ext uri="{96DAC541-7B7A-43D3-8B79-37D633B846F1}">
+                  <asvg:svgBlip xmlns:asvg="http://schemas.microsoft.com/office/drawing/2016/SVG/main" r:embed="rId6"/>
+                </a:ext>
+              </a:extLst>
+            </a:blip>
+            <a:stretch>
+              <a:fillRect/>
+            </a:stretch>
+          </p:blipFill>
+          <p:spPr>
+            <a:xfrm>
+              <a:off x="1485900" y="2372512"/>
+              <a:ext cx="914400" cy="914400"/>
+            </a:xfrm>
+            <a:prstGeom prst="rect">
+              <a:avLst/>
+            </a:prstGeom>
+          </p:spPr>
+        </p:pic>
+      </p:grpSp>
+      <p:grpSp>
+        <p:nvGrpSpPr>
+          <p:cNvPr id="16" name="Group 15">
+            <a:extLst>
+              <a:ext uri="{FF2B5EF4-FFF2-40B4-BE49-F238E27FC236}">
+                <a16:creationId xmlns:a16="http://schemas.microsoft.com/office/drawing/2014/main" id="{BBAC6C51-8817-41B6-A3A6-C58FDC9A3270}"/>
+              </a:ext>
+            </a:extLst>
+          </p:cNvPr>
+          <p:cNvGrpSpPr/>
+          <p:nvPr/>
+        </p:nvGrpSpPr>
+        <p:grpSpPr>
+          <a:xfrm>
+            <a:off x="838200" y="3276600"/>
+            <a:ext cx="1174376" cy="1566193"/>
+            <a:chOff x="1355912" y="1720719"/>
+            <a:chExt cx="1174376" cy="1566193"/>
+          </a:xfrm>
+        </p:grpSpPr>
+        <p:sp>
+          <p:nvSpPr>
+            <p:cNvPr id="17" name="Rectangle 16">
+              <a:extLst>
+                <a:ext uri="{FF2B5EF4-FFF2-40B4-BE49-F238E27FC236}">
+                  <a16:creationId xmlns:a16="http://schemas.microsoft.com/office/drawing/2014/main" id="{AC8EDCF6-0485-4A54-93FC-6F6937BD9F70}"/>
+                </a:ext>
+              </a:extLst>
+            </p:cNvPr>
+            <p:cNvSpPr/>
+            <p:nvPr/>
+          </p:nvSpPr>
+          <p:spPr>
+            <a:xfrm>
+              <a:off x="1355912" y="1720719"/>
+              <a:ext cx="1174376" cy="1197238"/>
+            </a:xfrm>
+            <a:prstGeom prst="rect">
+              <a:avLst/>
+            </a:prstGeom>
+          </p:spPr>
+          <p:style>
+            <a:lnRef idx="2">
+              <a:schemeClr val="accent1">
+                <a:shade val="50000"/>
+              </a:schemeClr>
+            </a:lnRef>
+            <a:fillRef idx="1">
+              <a:schemeClr val="accent1"/>
+            </a:fillRef>
+            <a:effectRef idx="0">
+              <a:schemeClr val="accent1"/>
+            </a:effectRef>
+            <a:fontRef idx="minor">
+              <a:schemeClr val="lt1"/>
+            </a:fontRef>
+          </p:style>
+          <p:txBody>
+            <a:bodyPr rtlCol="0" anchor="ctr"/>
+            <a:lstStyle/>
+            <a:p>
+              <a:pPr algn="ctr"/>
+              <a:r>
+                <a:rPr lang="en-US" dirty="0">
+                  <a:latin typeface="Century Gothic" panose="020B0502020202020204" pitchFamily="34" charset="0"/>
+                </a:rPr>
+                <a:t>Cisco Phone</a:t>
+              </a:r>
+            </a:p>
+            <a:p>
+              <a:pPr algn="ctr"/>
+              <a:endParaRPr lang="en-US" dirty="0">
+                <a:latin typeface="Century Gothic" panose="020B0502020202020204" pitchFamily="34" charset="0"/>
+              </a:endParaRPr>
+            </a:p>
+          </p:txBody>
+        </p:sp>
+        <p:pic>
+          <p:nvPicPr>
+            <p:cNvPr id="18" name="Graphic 17" descr="Telephone">
+              <a:extLst>
+                <a:ext uri="{FF2B5EF4-FFF2-40B4-BE49-F238E27FC236}">
+                  <a16:creationId xmlns:a16="http://schemas.microsoft.com/office/drawing/2014/main" id="{F4932AC9-1790-4AA5-AE9B-EC94003778CF}"/>
+                </a:ext>
+              </a:extLst>
+            </p:cNvPr>
+            <p:cNvPicPr>
+              <a:picLocks noChangeAspect="1"/>
+            </p:cNvPicPr>
+            <p:nvPr/>
+          </p:nvPicPr>
+          <p:blipFill>
+            <a:blip r:embed="rId5">
+              <a:extLst>
+                <a:ext uri="{28A0092B-C50C-407E-A947-70E740481C1C}">
+                  <a14:useLocalDpi xmlns:a14="http://schemas.microsoft.com/office/drawing/2010/main" val="0"/>
+                </a:ext>
+                <a:ext uri="{96DAC541-7B7A-43D3-8B79-37D633B846F1}">
+                  <asvg:svgBlip xmlns:asvg="http://schemas.microsoft.com/office/drawing/2016/SVG/main" r:embed="rId6"/>
+                </a:ext>
+              </a:extLst>
+            </a:blip>
+            <a:stretch>
+              <a:fillRect/>
+            </a:stretch>
+          </p:blipFill>
+          <p:spPr>
+            <a:xfrm>
+              <a:off x="1485900" y="2372512"/>
+              <a:ext cx="914400" cy="914400"/>
+            </a:xfrm>
+            <a:prstGeom prst="rect">
+              <a:avLst/>
+            </a:prstGeom>
+          </p:spPr>
+        </p:pic>
+      </p:grpSp>
+      <p:grpSp>
+        <p:nvGrpSpPr>
+          <p:cNvPr id="19" name="Group 18">
+            <a:extLst>
+              <a:ext uri="{FF2B5EF4-FFF2-40B4-BE49-F238E27FC236}">
+                <a16:creationId xmlns:a16="http://schemas.microsoft.com/office/drawing/2014/main" id="{942A71B4-15E8-4289-98C2-186ED60AD6E0}"/>
+              </a:ext>
+            </a:extLst>
+          </p:cNvPr>
+          <p:cNvGrpSpPr/>
+          <p:nvPr/>
+        </p:nvGrpSpPr>
+        <p:grpSpPr>
+          <a:xfrm>
+            <a:off x="850526" y="5063207"/>
+            <a:ext cx="1174376" cy="1566193"/>
+            <a:chOff x="1355912" y="1720719"/>
+            <a:chExt cx="1174376" cy="1566193"/>
+          </a:xfrm>
+        </p:grpSpPr>
+        <p:sp>
+          <p:nvSpPr>
+            <p:cNvPr id="20" name="Rectangle 19">
+              <a:extLst>
+                <a:ext uri="{FF2B5EF4-FFF2-40B4-BE49-F238E27FC236}">
+                  <a16:creationId xmlns:a16="http://schemas.microsoft.com/office/drawing/2014/main" id="{8731AB63-20E1-4D10-A5E0-E08BAEA930A0}"/>
+                </a:ext>
+              </a:extLst>
+            </p:cNvPr>
+            <p:cNvSpPr/>
+            <p:nvPr/>
+          </p:nvSpPr>
+          <p:spPr>
+            <a:xfrm>
+              <a:off x="1355912" y="1720719"/>
+              <a:ext cx="1174376" cy="1197238"/>
+            </a:xfrm>
+            <a:prstGeom prst="rect">
+              <a:avLst/>
+            </a:prstGeom>
+          </p:spPr>
+          <p:style>
+            <a:lnRef idx="2">
+              <a:schemeClr val="accent1">
+                <a:shade val="50000"/>
+              </a:schemeClr>
+            </a:lnRef>
+            <a:fillRef idx="1">
+              <a:schemeClr val="accent1"/>
+            </a:fillRef>
+            <a:effectRef idx="0">
+              <a:schemeClr val="accent1"/>
+            </a:effectRef>
+            <a:fontRef idx="minor">
+              <a:schemeClr val="lt1"/>
+            </a:fontRef>
+          </p:style>
+          <p:txBody>
+            <a:bodyPr rtlCol="0" anchor="ctr"/>
+            <a:lstStyle/>
+            <a:p>
+              <a:pPr algn="ctr"/>
+              <a:r>
+                <a:rPr lang="en-US" dirty="0">
+                  <a:latin typeface="Century Gothic" panose="020B0502020202020204" pitchFamily="34" charset="0"/>
+                </a:rPr>
+                <a:t>Cisco Phone</a:t>
+              </a:r>
+            </a:p>
+            <a:p>
+              <a:pPr algn="ctr"/>
+              <a:endParaRPr lang="en-US" dirty="0">
+                <a:latin typeface="Century Gothic" panose="020B0502020202020204" pitchFamily="34" charset="0"/>
+              </a:endParaRPr>
+            </a:p>
+          </p:txBody>
+        </p:sp>
+        <p:pic>
+          <p:nvPicPr>
+            <p:cNvPr id="21" name="Graphic 20" descr="Telephone">
+              <a:extLst>
+                <a:ext uri="{FF2B5EF4-FFF2-40B4-BE49-F238E27FC236}">
+                  <a16:creationId xmlns:a16="http://schemas.microsoft.com/office/drawing/2014/main" id="{AAA545D3-D127-4228-8CE3-63E6EC1C7D06}"/>
+                </a:ext>
+              </a:extLst>
+            </p:cNvPr>
+            <p:cNvPicPr>
+              <a:picLocks noChangeAspect="1"/>
+            </p:cNvPicPr>
+            <p:nvPr/>
+          </p:nvPicPr>
+          <p:blipFill>
+            <a:blip r:embed="rId5">
+              <a:extLst>
+                <a:ext uri="{28A0092B-C50C-407E-A947-70E740481C1C}">
+                  <a14:useLocalDpi xmlns:a14="http://schemas.microsoft.com/office/drawing/2010/main" val="0"/>
+                </a:ext>
+                <a:ext uri="{96DAC541-7B7A-43D3-8B79-37D633B846F1}">
+                  <asvg:svgBlip xmlns:asvg="http://schemas.microsoft.com/office/drawing/2016/SVG/main" r:embed="rId6"/>
+                </a:ext>
+              </a:extLst>
+            </a:blip>
+            <a:stretch>
+              <a:fillRect/>
+            </a:stretch>
+          </p:blipFill>
+          <p:spPr>
+            <a:xfrm>
+              <a:off x="1485900" y="2372512"/>
+              <a:ext cx="914400" cy="914400"/>
+            </a:xfrm>
+            <a:prstGeom prst="rect">
+              <a:avLst/>
+            </a:prstGeom>
+          </p:spPr>
+        </p:pic>
+      </p:grpSp>
+      <p:cxnSp>
+        <p:nvCxnSpPr>
+          <p:cNvPr id="32" name="Connector: Curved 31">
+            <a:extLst>
+              <a:ext uri="{FF2B5EF4-FFF2-40B4-BE49-F238E27FC236}">
+                <a16:creationId xmlns:a16="http://schemas.microsoft.com/office/drawing/2014/main" id="{AC3E63F1-E164-4469-99BE-56B1EA75CBCE}"/>
+              </a:ext>
+            </a:extLst>
+          </p:cNvPr>
+          <p:cNvCxnSpPr>
+            <a:cxnSpLocks/>
+            <a:endCxn id="6" idx="1"/>
+          </p:cNvCxnSpPr>
+          <p:nvPr/>
+        </p:nvCxnSpPr>
+        <p:spPr>
+          <a:xfrm flipV="1">
+            <a:off x="2035918" y="3644063"/>
+            <a:ext cx="1555569" cy="363759"/>
+          </a:xfrm>
+          <a:prstGeom prst="curvedConnector3">
+            <a:avLst>
+              <a:gd name="adj1" fmla="val 50000"/>
+            </a:avLst>
+          </a:prstGeom>
+        </p:spPr>
+        <p:style>
+          <a:lnRef idx="1">
+            <a:schemeClr val="accent1"/>
+          </a:lnRef>
+          <a:fillRef idx="0">
+            <a:schemeClr val="accent1"/>
+          </a:fillRef>
+          <a:effectRef idx="0">
+            <a:schemeClr val="accent1"/>
+          </a:effectRef>
+          <a:fontRef idx="minor">
+            <a:schemeClr val="tx1"/>
+          </a:fontRef>
+        </p:style>
+      </p:cxnSp>
+      <p:cxnSp>
+        <p:nvCxnSpPr>
+          <p:cNvPr id="36" name="Connector: Curved 35">
+            <a:extLst>
+              <a:ext uri="{FF2B5EF4-FFF2-40B4-BE49-F238E27FC236}">
+                <a16:creationId xmlns:a16="http://schemas.microsoft.com/office/drawing/2014/main" id="{55A9D18A-B33E-4BA0-BE17-49D76FBE8AA3}"/>
+              </a:ext>
+            </a:extLst>
+          </p:cNvPr>
+          <p:cNvCxnSpPr>
+            <a:cxnSpLocks/>
+            <a:endCxn id="6" idx="1"/>
+          </p:cNvCxnSpPr>
+          <p:nvPr/>
+        </p:nvCxnSpPr>
+        <p:spPr>
+          <a:xfrm>
+            <a:off x="2048244" y="2175793"/>
+            <a:ext cx="1543243" cy="1468270"/>
+          </a:xfrm>
+          <a:prstGeom prst="curvedConnector3">
+            <a:avLst/>
+          </a:prstGeom>
+        </p:spPr>
+        <p:style>
+          <a:lnRef idx="1">
+            <a:schemeClr val="accent1"/>
+          </a:lnRef>
+          <a:fillRef idx="0">
+            <a:schemeClr val="accent1"/>
+          </a:fillRef>
+          <a:effectRef idx="0">
+            <a:schemeClr val="accent1"/>
+          </a:effectRef>
+          <a:fontRef idx="minor">
+            <a:schemeClr val="tx1"/>
+          </a:fontRef>
+        </p:style>
+      </p:cxnSp>
+      <p:cxnSp>
+        <p:nvCxnSpPr>
+          <p:cNvPr id="44" name="Connector: Curved 43">
+            <a:extLst>
+              <a:ext uri="{FF2B5EF4-FFF2-40B4-BE49-F238E27FC236}">
+                <a16:creationId xmlns:a16="http://schemas.microsoft.com/office/drawing/2014/main" id="{12AF6C68-40CE-4778-858D-1F9F1E4A8DE5}"/>
+              </a:ext>
+            </a:extLst>
+          </p:cNvPr>
+          <p:cNvCxnSpPr>
+            <a:cxnSpLocks/>
+            <a:stCxn id="6" idx="3"/>
+            <a:endCxn id="7" idx="1"/>
+          </p:cNvCxnSpPr>
+          <p:nvPr/>
+        </p:nvCxnSpPr>
+        <p:spPr>
+          <a:xfrm flipV="1">
+            <a:off x="5334000" y="3560857"/>
+            <a:ext cx="1524000" cy="83206"/>
+          </a:xfrm>
+          <a:prstGeom prst="curvedConnector3">
+            <a:avLst/>
+          </a:prstGeom>
+        </p:spPr>
+        <p:style>
+          <a:lnRef idx="1">
+            <a:schemeClr val="accent1"/>
+          </a:lnRef>
+          <a:fillRef idx="0">
+            <a:schemeClr val="accent1"/>
+          </a:fillRef>
+          <a:effectRef idx="0">
+            <a:schemeClr val="accent1"/>
+          </a:effectRef>
+          <a:fontRef idx="minor">
+            <a:schemeClr val="tx1"/>
+          </a:fontRef>
+        </p:style>
+      </p:cxnSp>
+      <p:cxnSp>
+        <p:nvCxnSpPr>
+          <p:cNvPr id="46" name="Connector: Curved 45">
+            <a:extLst>
+              <a:ext uri="{FF2B5EF4-FFF2-40B4-BE49-F238E27FC236}">
+                <a16:creationId xmlns:a16="http://schemas.microsoft.com/office/drawing/2014/main" id="{5619E92C-934A-4E53-B76A-F13ABF94FF45}"/>
+              </a:ext>
+            </a:extLst>
+          </p:cNvPr>
+          <p:cNvCxnSpPr>
+            <a:cxnSpLocks/>
+          </p:cNvCxnSpPr>
+          <p:nvPr/>
+        </p:nvCxnSpPr>
+        <p:spPr>
+          <a:xfrm flipV="1">
+            <a:off x="8894875" y="2235045"/>
+            <a:ext cx="1944575" cy="1296780"/>
+          </a:xfrm>
+          <a:prstGeom prst="curvedConnector2">
+            <a:avLst/>
+          </a:prstGeom>
+        </p:spPr>
+        <p:style>
+          <a:lnRef idx="1">
+            <a:schemeClr val="accent1"/>
+          </a:lnRef>
+          <a:fillRef idx="0">
+            <a:schemeClr val="accent1"/>
+          </a:fillRef>
+          <a:effectRef idx="0">
+            <a:schemeClr val="accent1"/>
+          </a:effectRef>
+          <a:fontRef idx="minor">
+            <a:schemeClr val="tx1"/>
+          </a:fontRef>
+        </p:style>
+      </p:cxnSp>
+      <p:grpSp>
+        <p:nvGrpSpPr>
+          <p:cNvPr id="54" name="Group 53">
+            <a:extLst>
+              <a:ext uri="{FF2B5EF4-FFF2-40B4-BE49-F238E27FC236}">
+                <a16:creationId xmlns:a16="http://schemas.microsoft.com/office/drawing/2014/main" id="{86FE305F-EF92-4D77-9E7B-DCE10AE2D47B}"/>
+              </a:ext>
+            </a:extLst>
+          </p:cNvPr>
+          <p:cNvGrpSpPr/>
+          <p:nvPr/>
+        </p:nvGrpSpPr>
+        <p:grpSpPr>
+          <a:xfrm>
+            <a:off x="2971800" y="1524000"/>
+            <a:ext cx="2362200" cy="936210"/>
+            <a:chOff x="3733800" y="1694343"/>
+            <a:chExt cx="2362200" cy="936210"/>
+          </a:xfrm>
+        </p:grpSpPr>
+        <p:sp>
+          <p:nvSpPr>
+            <p:cNvPr id="53" name="Rectangle 52">
+              <a:extLst>
+                <a:ext uri="{FF2B5EF4-FFF2-40B4-BE49-F238E27FC236}">
+                  <a16:creationId xmlns:a16="http://schemas.microsoft.com/office/drawing/2014/main" id="{CE88398D-EC54-47C6-AC73-C1C7A7A5721A}"/>
+                </a:ext>
+              </a:extLst>
+            </p:cNvPr>
+            <p:cNvSpPr/>
+            <p:nvPr/>
+          </p:nvSpPr>
+          <p:spPr>
+            <a:xfrm>
+              <a:off x="3733800" y="1694343"/>
+              <a:ext cx="2362200" cy="858743"/>
+            </a:xfrm>
+            <a:prstGeom prst="rect">
+              <a:avLst/>
+            </a:prstGeom>
+          </p:spPr>
+          <p:style>
+            <a:lnRef idx="2">
+              <a:schemeClr val="accent1">
+                <a:shade val="50000"/>
+              </a:schemeClr>
+            </a:lnRef>
+            <a:fillRef idx="1">
+              <a:schemeClr val="accent1"/>
+            </a:fillRef>
+            <a:effectRef idx="0">
+              <a:schemeClr val="accent1"/>
+            </a:effectRef>
+            <a:fontRef idx="minor">
+              <a:schemeClr val="lt1"/>
+            </a:fontRef>
+          </p:style>
+          <p:txBody>
+            <a:bodyPr rtlCol="0" anchor="ctr"/>
+            <a:lstStyle/>
+            <a:p>
+              <a:r>
+                <a:rPr lang="en-US" dirty="0">
+                  <a:latin typeface="Century Gothic" panose="020B0502020202020204" pitchFamily="34" charset="0"/>
+                </a:rPr>
+                <a:t>WireShark </a:t>
+              </a:r>
+            </a:p>
+          </p:txBody>
+        </p:sp>
+        <p:pic>
+          <p:nvPicPr>
+            <p:cNvPr id="52" name="Graphic 51" descr="Monitor">
+              <a:extLst>
+                <a:ext uri="{FF2B5EF4-FFF2-40B4-BE49-F238E27FC236}">
+                  <a16:creationId xmlns:a16="http://schemas.microsoft.com/office/drawing/2014/main" id="{2C56325C-5927-4A08-AF20-D3F21B2029F0}"/>
+                </a:ext>
+              </a:extLst>
+            </p:cNvPr>
+            <p:cNvPicPr>
+              <a:picLocks noChangeAspect="1"/>
+            </p:cNvPicPr>
+            <p:nvPr/>
+          </p:nvPicPr>
+          <p:blipFill>
+            <a:blip r:embed="rId7">
+              <a:extLst>
+                <a:ext uri="{28A0092B-C50C-407E-A947-70E740481C1C}">
+                  <a14:useLocalDpi xmlns:a14="http://schemas.microsoft.com/office/drawing/2010/main" val="0"/>
+                </a:ext>
+                <a:ext uri="{96DAC541-7B7A-43D3-8B79-37D633B846F1}">
+                  <asvg:svgBlip xmlns:asvg="http://schemas.microsoft.com/office/drawing/2016/SVG/main" r:embed="rId8"/>
+                </a:ext>
+              </a:extLst>
+            </a:blip>
+            <a:stretch>
+              <a:fillRect/>
+            </a:stretch>
+          </p:blipFill>
+          <p:spPr>
+            <a:xfrm>
+              <a:off x="5130966" y="1716153"/>
+              <a:ext cx="888834" cy="914400"/>
+            </a:xfrm>
+            <a:prstGeom prst="rect">
+              <a:avLst/>
+            </a:prstGeom>
+          </p:spPr>
+        </p:pic>
+      </p:grpSp>
+      <p:cxnSp>
+        <p:nvCxnSpPr>
+          <p:cNvPr id="65" name="Connector: Curved 64">
+            <a:extLst>
+              <a:ext uri="{FF2B5EF4-FFF2-40B4-BE49-F238E27FC236}">
+                <a16:creationId xmlns:a16="http://schemas.microsoft.com/office/drawing/2014/main" id="{94252763-D616-4639-9D7E-ED0AD70818F5}"/>
+              </a:ext>
+            </a:extLst>
+          </p:cNvPr>
+          <p:cNvCxnSpPr>
+            <a:cxnSpLocks/>
+          </p:cNvCxnSpPr>
+          <p:nvPr/>
+        </p:nvCxnSpPr>
+        <p:spPr>
+          <a:xfrm rot="5400000" flipH="1" flipV="1">
+            <a:off x="1958482" y="3853394"/>
+            <a:ext cx="1928026" cy="1795186"/>
+          </a:xfrm>
+          <a:prstGeom prst="curvedConnector3">
+            <a:avLst>
+              <a:gd name="adj1" fmla="val 50000"/>
+            </a:avLst>
+          </a:prstGeom>
+        </p:spPr>
+        <p:style>
+          <a:lnRef idx="1">
+            <a:schemeClr val="accent1"/>
+          </a:lnRef>
+          <a:fillRef idx="0">
+            <a:schemeClr val="accent1"/>
+          </a:fillRef>
+          <a:effectRef idx="0">
+            <a:schemeClr val="accent1"/>
+          </a:effectRef>
+          <a:fontRef idx="minor">
+            <a:schemeClr val="tx1"/>
+          </a:fontRef>
+        </p:style>
+      </p:cxnSp>
+      <p:cxnSp>
+        <p:nvCxnSpPr>
+          <p:cNvPr id="56" name="Connector: Curved 55">
+            <a:extLst>
+              <a:ext uri="{FF2B5EF4-FFF2-40B4-BE49-F238E27FC236}">
+                <a16:creationId xmlns:a16="http://schemas.microsoft.com/office/drawing/2014/main" id="{53AF2A81-BA5E-49C1-BB38-FF5599DEF1AB}"/>
+              </a:ext>
+            </a:extLst>
+          </p:cNvPr>
+          <p:cNvCxnSpPr>
+            <a:cxnSpLocks/>
+            <a:endCxn id="6" idx="0"/>
+          </p:cNvCxnSpPr>
+          <p:nvPr/>
+        </p:nvCxnSpPr>
+        <p:spPr>
+          <a:xfrm rot="16200000" flipH="1">
+            <a:off x="3765578" y="2449534"/>
+            <a:ext cx="763958" cy="630373"/>
+          </a:xfrm>
+          <a:prstGeom prst="curvedConnector3">
+            <a:avLst>
+              <a:gd name="adj1" fmla="val 50000"/>
+            </a:avLst>
+          </a:prstGeom>
+        </p:spPr>
+        <p:style>
+          <a:lnRef idx="1">
+            <a:schemeClr val="accent1"/>
+          </a:lnRef>
+          <a:fillRef idx="0">
+            <a:schemeClr val="accent1"/>
+          </a:fillRef>
+          <a:effectRef idx="0">
+            <a:schemeClr val="accent1"/>
+          </a:effectRef>
+          <a:fontRef idx="minor">
+            <a:schemeClr val="tx1"/>
+          </a:fontRef>
+        </p:style>
+      </p:cxnSp>
+      <p:sp>
+        <p:nvSpPr>
+          <p:cNvPr id="29" name="TextBox 28">
+            <a:extLst>
+              <a:ext uri="{FF2B5EF4-FFF2-40B4-BE49-F238E27FC236}">
+                <a16:creationId xmlns:a16="http://schemas.microsoft.com/office/drawing/2014/main" id="{9C63D26F-6D56-D347-80D6-57E693534092}"/>
+              </a:ext>
+            </a:extLst>
+          </p:cNvPr>
+          <p:cNvSpPr txBox="1"/>
+          <p:nvPr/>
+        </p:nvSpPr>
+        <p:spPr>
+          <a:xfrm>
+            <a:off x="10591800" y="2754868"/>
+            <a:ext cx="1295400" cy="369332"/>
+          </a:xfrm>
+          <a:prstGeom prst="rect">
+            <a:avLst/>
+          </a:prstGeom>
+          <a:noFill/>
+        </p:spPr>
+        <p:txBody>
+          <a:bodyPr wrap="square" rtlCol="0">
+            <a:spAutoFit/>
+          </a:bodyPr>
+          <a:lstStyle/>
+          <a:p>
+            <a:r>
+              <a:rPr lang="en-US" sz="1600" dirty="0">
+                <a:latin typeface="Century Gothic" panose="020B0502020202020204" pitchFamily="34" charset="0"/>
+              </a:rPr>
+              <a:t>VLAN ID : 1</a:t>
+            </a:r>
+            <a:r>
+              <a:rPr lang="en-US" dirty="0">
+                <a:latin typeface="Century Gothic" panose="020B0502020202020204" pitchFamily="34" charset="0"/>
+              </a:rPr>
+              <a:t> </a:t>
+            </a:r>
+          </a:p>
+        </p:txBody>
+      </p:sp>
+      <p:sp>
+        <p:nvSpPr>
+          <p:cNvPr id="39" name="Cloud 38">
+            <a:extLst>
+              <a:ext uri="{FF2B5EF4-FFF2-40B4-BE49-F238E27FC236}">
+                <a16:creationId xmlns:a16="http://schemas.microsoft.com/office/drawing/2014/main" id="{191569E7-0371-5A48-A572-38D8CC187DCC}"/>
+              </a:ext>
+            </a:extLst>
+          </p:cNvPr>
+          <p:cNvSpPr/>
+          <p:nvPr/>
+        </p:nvSpPr>
+        <p:spPr>
+          <a:xfrm>
+            <a:off x="9753600" y="1143000"/>
+            <a:ext cx="2171700" cy="1295400"/>
+          </a:xfrm>
+          <a:prstGeom prst="cloud">
+            <a:avLst/>
+          </a:prstGeom>
+        </p:spPr>
+        <p:style>
+          <a:lnRef idx="2">
+            <a:schemeClr val="accent1">
+              <a:shade val="50000"/>
+            </a:schemeClr>
+          </a:lnRef>
+          <a:fillRef idx="1">
+            <a:schemeClr val="accent1"/>
+          </a:fillRef>
+          <a:effectRef idx="0">
+            <a:schemeClr val="accent1"/>
+          </a:effectRef>
+          <a:fontRef idx="minor">
+            <a:schemeClr val="lt1"/>
+          </a:fontRef>
+        </p:style>
+        <p:txBody>
+          <a:bodyPr rtlCol="0" anchor="b"/>
+          <a:lstStyle/>
+          <a:p>
+            <a:pPr algn="ctr"/>
+            <a:r>
+              <a:rPr lang="en-US" dirty="0">
+                <a:latin typeface="Century Gothic" panose="020B0502020202020204" pitchFamily="34" charset="0"/>
+              </a:rPr>
+              <a:t>UC Davis Internet WAN</a:t>
+            </a:r>
+          </a:p>
+        </p:txBody>
+      </p:sp>
+      <p:cxnSp>
+        <p:nvCxnSpPr>
+          <p:cNvPr id="41" name="Connector: Curved 45">
+            <a:extLst>
+              <a:ext uri="{FF2B5EF4-FFF2-40B4-BE49-F238E27FC236}">
+                <a16:creationId xmlns:a16="http://schemas.microsoft.com/office/drawing/2014/main" id="{A542BA49-5D5F-604D-831A-6A87B2C08813}"/>
+              </a:ext>
+            </a:extLst>
+          </p:cNvPr>
+          <p:cNvCxnSpPr>
+            <a:cxnSpLocks/>
+            <a:endCxn id="9" idx="3"/>
+          </p:cNvCxnSpPr>
+          <p:nvPr/>
+        </p:nvCxnSpPr>
+        <p:spPr>
+          <a:xfrm>
+            <a:off x="8913924" y="3651616"/>
+            <a:ext cx="2039826" cy="689650"/>
+          </a:xfrm>
+          <a:prstGeom prst="curvedConnector2">
+            <a:avLst/>
+          </a:prstGeom>
+        </p:spPr>
+        <p:style>
+          <a:lnRef idx="1">
+            <a:schemeClr val="accent1"/>
+          </a:lnRef>
+          <a:fillRef idx="0">
+            <a:schemeClr val="accent1"/>
+          </a:fillRef>
+          <a:effectRef idx="0">
+            <a:schemeClr val="accent1"/>
+          </a:effectRef>
+          <a:fontRef idx="minor">
+            <a:schemeClr val="tx1"/>
+          </a:fontRef>
+        </p:style>
+      </p:cxnSp>
+      <p:sp>
+        <p:nvSpPr>
+          <p:cNvPr id="45" name="TextBox 44">
+            <a:extLst>
+              <a:ext uri="{FF2B5EF4-FFF2-40B4-BE49-F238E27FC236}">
+                <a16:creationId xmlns:a16="http://schemas.microsoft.com/office/drawing/2014/main" id="{E76546C0-F7EE-1F4A-AFF2-4321A6BB5012}"/>
+              </a:ext>
+            </a:extLst>
+          </p:cNvPr>
+          <p:cNvSpPr txBox="1"/>
+          <p:nvPr/>
+        </p:nvSpPr>
+        <p:spPr>
+          <a:xfrm>
+            <a:off x="10515600" y="3669268"/>
+            <a:ext cx="1524000" cy="338554"/>
+          </a:xfrm>
+          <a:prstGeom prst="rect">
+            <a:avLst/>
+          </a:prstGeom>
+          <a:noFill/>
+        </p:spPr>
+        <p:txBody>
+          <a:bodyPr wrap="square" rtlCol="0">
+            <a:spAutoFit/>
+          </a:bodyPr>
+          <a:lstStyle/>
+          <a:p>
+            <a:r>
+              <a:rPr lang="en-US" sz="1600" dirty="0">
+                <a:latin typeface="Century Gothic" panose="020B0502020202020204" pitchFamily="34" charset="0"/>
+              </a:rPr>
+              <a:t>VLAN ID : 200 </a:t>
+            </a:r>
+          </a:p>
+        </p:txBody>
+      </p:sp>
+    </p:spTree>
+    <p:extLst>
+      <p:ext uri="{BB962C8B-B14F-4D97-AF65-F5344CB8AC3E}">
+        <p14:creationId xmlns:p14="http://schemas.microsoft.com/office/powerpoint/2010/main" val="3961494294"/>
+      </p:ext>
+    </p:extLst>
+  </p:cSld>
+  <p:clrMapOvr>
+    <a:masterClrMapping/>
+  </p:clrMapOvr>
+</p:sld>
+</file>
+
+<file path=ppt/slides/slide3.xml><?xml version="1.0" encoding="utf-8"?>
 <p:sld xmlns:a="http://schemas.openxmlformats.org/drawingml/2006/main" xmlns:r="http://schemas.openxmlformats.org/officeDocument/2006/relationships" xmlns:p="http://schemas.openxmlformats.org/presentationml/2006/main">
   <p:cSld>
     <p:spTree>
@@ -4525,8 +5815,11 @@
             <a:bodyPr rtlCol="0" anchor="ctr"/>
             <a:lstStyle/>
             <a:p>
-              <a:pPr algn="ctr"/>
-              <a:endParaRPr lang="en-US"/>
+              <a:pPr marL="285750" indent="-285750">
+                <a:buFont typeface="Arial" panose="020B0604020202020204" pitchFamily="34" charset="0"/>
+                <a:buChar char="•"/>
+              </a:pPr>
+              <a:endParaRPr lang="en-US" dirty="0"/>
             </a:p>
           </p:txBody>
         </p:sp>
@@ -4575,6 +5868,11 @@
             <a:avLst/>
           </a:prstGeom>
           <a:noFill/>
+          <a:ln>
+            <a:solidFill>
+              <a:schemeClr val="accent1"/>
+            </a:solidFill>
+          </a:ln>
         </p:spPr>
         <p:txBody>
           <a:bodyPr wrap="square" rtlCol="0">
@@ -4648,7 +5946,18 @@
               <a:rPr lang="en-US" dirty="0" err="1"/>
               <a:t>libSRTP</a:t>
             </a:r>
-            <a:endParaRPr lang="en-US" dirty="0"/>
+            <a:r>
+              <a:rPr lang="en-US" dirty="0"/>
+              <a:t>, </a:t>
+            </a:r>
+            <a:r>
+              <a:rPr lang="en-US" dirty="0" err="1"/>
+              <a:t>StarTrinity</a:t>
+            </a:r>
+            <a:r>
+              <a:rPr lang="en-US" dirty="0"/>
+              <a:t> SIP Tester</a:t>
+            </a:r>
           </a:p>
           <a:p>
             <a:pPr marL="285750" indent="-285750">
@@ -4688,49 +5997,6 @@
             <a:r>
               <a:rPr lang="en-US" dirty="0"/>
               <a:t>Lack of VoIP implementation details </a:t>
-            </a:r>
-          </a:p>
-        </p:txBody>
-      </p:sp>
-      <p:sp>
-        <p:nvSpPr>
-          <p:cNvPr id="24" name="TextBox 23"/>
-          <p:cNvSpPr txBox="1"/>
-          <p:nvPr/>
-        </p:nvSpPr>
-        <p:spPr>
-          <a:xfrm>
-            <a:off x="6095998" y="4589120"/>
-            <a:ext cx="5190067" cy="1200329"/>
-          </a:xfrm>
-          <a:prstGeom prst="rect">
-            <a:avLst/>
-          </a:prstGeom>
-          <a:noFill/>
-        </p:spPr>
-        <p:txBody>
-          <a:bodyPr wrap="square" rtlCol="0">
-            <a:spAutoFit/>
-          </a:bodyPr>
-          <a:lstStyle/>
-          <a:p>
-            <a:pPr marL="285750" indent="-285750">
-              <a:buFont typeface="Arial" panose="020B0604020202020204" pitchFamily="34" charset="0"/>
-              <a:buChar char="•"/>
-            </a:pPr>
-            <a:r>
-              <a:rPr lang="en-US" dirty="0"/>
-              <a:t>Are there vulnerabilities during phone registration process?</a:t>
-            </a:r>
-          </a:p>
-          <a:p>
-            <a:pPr marL="285750" indent="-285750">
-              <a:buFont typeface="Arial" panose="020B0604020202020204" pitchFamily="34" charset="0"/>
-              <a:buChar char="•"/>
-            </a:pPr>
-            <a:r>
-              <a:rPr lang="en-US" dirty="0"/>
-              <a:t>Can vulnerabilities in TLS 1.2 be used in a “big” way?</a:t>
             </a:r>
           </a:p>
         </p:txBody>
@@ -4750,7 +6016,7 @@
         <p:spPr>
           <a:xfrm>
             <a:off x="6096000" y="2443828"/>
-            <a:ext cx="5190067" cy="923330"/>
+            <a:ext cx="5190067" cy="1754326"/>
           </a:xfrm>
           <a:prstGeom prst="rect">
             <a:avLst/>
@@ -4780,6 +6046,26 @@
             <a:r>
               <a:rPr lang="en-US" dirty="0"/>
               <a:t>Confirm SIP registration process with info from the TD</a:t>
+            </a:r>
+          </a:p>
+          <a:p>
+            <a:pPr marL="285750" indent="-285750">
+              <a:buFont typeface="Arial" panose="020B0604020202020204" pitchFamily="34" charset="0"/>
+              <a:buChar char="•"/>
+            </a:pPr>
+            <a:r>
+              <a:rPr lang="en-US" dirty="0"/>
+              <a:t>Decide on a software tool for load testing/attack development</a:t>
+            </a:r>
+          </a:p>
+          <a:p>
+            <a:pPr marL="742950" lvl="1" indent="-285750">
+              <a:buFont typeface="Arial" panose="020B0604020202020204" pitchFamily="34" charset="0"/>
+              <a:buChar char="•"/>
+            </a:pPr>
+            <a:r>
+              <a:rPr lang="en-US" dirty="0"/>
+              <a:t>Use a SIP client to create sessions</a:t>
             </a:r>
           </a:p>
         </p:txBody>
@@ -4820,6 +6106,45 @@
                 </a:solidFill>
               </a:rPr>
               <a:t>X</a:t>
+            </a:r>
+          </a:p>
+        </p:txBody>
+      </p:sp>
+      <p:sp>
+        <p:nvSpPr>
+          <p:cNvPr id="5" name="TextBox 4">
+            <a:extLst>
+              <a:ext uri="{FF2B5EF4-FFF2-40B4-BE49-F238E27FC236}">
+                <a16:creationId xmlns:a16="http://schemas.microsoft.com/office/drawing/2014/main" id="{232A4676-2897-3C40-B885-2A7DCE241683}"/>
+              </a:ext>
+            </a:extLst>
+          </p:cNvPr>
+          <p:cNvSpPr txBox="1"/>
+          <p:nvPr/>
+        </p:nvSpPr>
+        <p:spPr>
+          <a:xfrm>
+            <a:off x="6114534" y="4744134"/>
+            <a:ext cx="4343400" cy="369332"/>
+          </a:xfrm>
+          <a:prstGeom prst="rect">
+            <a:avLst/>
+          </a:prstGeom>
+          <a:noFill/>
+        </p:spPr>
+        <p:txBody>
+          <a:bodyPr wrap="square" rtlCol="0">
+            <a:spAutoFit/>
+          </a:bodyPr>
+          <a:lstStyle/>
+          <a:p>
+            <a:pPr marL="285750" indent="-285750">
+              <a:buFont typeface="Arial" panose="020B0604020202020204" pitchFamily="34" charset="0"/>
+              <a:buChar char="•"/>
+            </a:pPr>
+            <a:r>
+              <a:rPr lang="en-US" dirty="0"/>
+              <a:t>Next Slide</a:t>
             </a:r>
           </a:p>
         </p:txBody>
@@ -4837,7 +6162,7 @@
 </p:sld>
 </file>
 
-<file path=ppt/slides/slide3.xml><?xml version="1.0" encoding="utf-8"?>
+<file path=ppt/slides/slide4.xml><?xml version="1.0" encoding="utf-8"?>
 <p:sld xmlns:a="http://schemas.openxmlformats.org/drawingml/2006/main" xmlns:r="http://schemas.openxmlformats.org/officeDocument/2006/relationships" xmlns:p="http://schemas.openxmlformats.org/presentationml/2006/main">
   <p:cSld>
     <p:spTree>
@@ -4856,10 +6181,10 @@
       </p:grpSpPr>
       <p:grpSp>
         <p:nvGrpSpPr>
-          <p:cNvPr id="27" name="Group 26">
+          <p:cNvPr id="4" name="Group 3">
             <a:extLst>
               <a:ext uri="{FF2B5EF4-FFF2-40B4-BE49-F238E27FC236}">
-                <a16:creationId xmlns:a16="http://schemas.microsoft.com/office/drawing/2014/main" id="{640919FC-2550-4AA6-AB87-5D070B03AACE}"/>
+                <a16:creationId xmlns:a16="http://schemas.microsoft.com/office/drawing/2014/main" id="{3EB92F1A-BAEE-5D41-9E61-8938E2E6883C}"/>
               </a:ext>
             </a:extLst>
           </p:cNvPr>
@@ -4868,54 +6193,18 @@
         </p:nvGrpSpPr>
         <p:grpSpPr>
           <a:xfrm>
-            <a:off x="6445698" y="3637057"/>
-            <a:ext cx="2133600" cy="1370181"/>
-            <a:chOff x="6393795" y="3407155"/>
-            <a:chExt cx="2133600" cy="1370181"/>
+            <a:off x="914400" y="990600"/>
+            <a:ext cx="10591800" cy="4343399"/>
+            <a:chOff x="-2362200" y="-455010"/>
+            <a:chExt cx="8761664" cy="3391324"/>
           </a:xfrm>
         </p:grpSpPr>
-        <p:pic>
-          <p:nvPicPr>
-            <p:cNvPr id="26" name="Picture 25">
+        <p:sp>
+          <p:nvSpPr>
+            <p:cNvPr id="5" name="Rectangle 4">
               <a:extLst>
                 <a:ext uri="{FF2B5EF4-FFF2-40B4-BE49-F238E27FC236}">
-                  <a16:creationId xmlns:a16="http://schemas.microsoft.com/office/drawing/2014/main" id="{6A33C62D-5BB1-4041-B4C2-EA7584D3EA3D}"/>
-                </a:ext>
-              </a:extLst>
-            </p:cNvPr>
-            <p:cNvPicPr>
-              <a:picLocks noChangeAspect="1"/>
-            </p:cNvPicPr>
-            <p:nvPr/>
-          </p:nvPicPr>
-          <p:blipFill>
-            <a:blip r:embed="rId2" cstate="print">
-              <a:extLst>
-                <a:ext uri="{28A0092B-C50C-407E-A947-70E740481C1C}">
-                  <a14:useLocalDpi xmlns:a14="http://schemas.microsoft.com/office/drawing/2010/main" val="0"/>
-                </a:ext>
-              </a:extLst>
-            </a:blip>
-            <a:stretch>
-              <a:fillRect/>
-            </a:stretch>
-          </p:blipFill>
-          <p:spPr>
-            <a:xfrm>
-              <a:off x="6629400" y="4267200"/>
-              <a:ext cx="1662391" cy="510136"/>
-            </a:xfrm>
-            <a:prstGeom prst="rect">
-              <a:avLst/>
-            </a:prstGeom>
-          </p:spPr>
-        </p:pic>
-        <p:sp>
-          <p:nvSpPr>
-            <p:cNvPr id="7" name="Rectangle 6">
-              <a:extLst>
-                <a:ext uri="{FF2B5EF4-FFF2-40B4-BE49-F238E27FC236}">
-                  <a16:creationId xmlns:a16="http://schemas.microsoft.com/office/drawing/2014/main" id="{9964B77B-5845-4C64-86DF-8E42AAD312FF}"/>
+                  <a16:creationId xmlns:a16="http://schemas.microsoft.com/office/drawing/2014/main" id="{7118EAFB-50A5-5644-92AD-FC3C40AAE3FB}"/>
                 </a:ext>
               </a:extLst>
             </p:cNvPr>
@@ -4924,8 +6213,8 @@
           </p:nvSpPr>
           <p:spPr>
             <a:xfrm>
-              <a:off x="6393795" y="3407155"/>
-              <a:ext cx="2133600" cy="914400"/>
+              <a:off x="-2362200" y="-455010"/>
+              <a:ext cx="8761664" cy="3391324"/>
             </a:xfrm>
             <a:prstGeom prst="rect">
               <a:avLst/>
@@ -4951,880 +6240,133 @@
             <a:bodyPr rtlCol="0" anchor="ctr"/>
             <a:lstStyle/>
             <a:p>
-              <a:pPr algn="ctr"/>
+              <a:pPr>
+                <a:lnSpc>
+                  <a:spcPct val="150000"/>
+                </a:lnSpc>
+              </a:pPr>
               <a:r>
-                <a:rPr lang="en-US" dirty="0"/>
-                <a:t>Cisco NAM</a:t>
+                <a:rPr lang="en-IN" dirty="0">
+                  <a:latin typeface="Century Gothic" panose="020B0502020202020204" pitchFamily="34" charset="0"/>
+                </a:rPr>
+                <a:t>1. How does the phone registration process work? (why 3 servers and the encryption process for SIP and RTP).</a:t>
+              </a:r>
+            </a:p>
+            <a:p>
+              <a:pPr>
+                <a:lnSpc>
+                  <a:spcPct val="150000"/>
+                </a:lnSpc>
+              </a:pPr>
+              <a:r>
+                <a:rPr lang="en-IN" dirty="0">
+                  <a:latin typeface="Century Gothic" panose="020B0502020202020204" pitchFamily="34" charset="0"/>
+                </a:rPr>
+                <a:t>2. What would it take to create a fake client and register it with the SIP servers, so that we can throw garbage at the phones?</a:t>
+              </a:r>
+            </a:p>
+            <a:p>
+              <a:pPr>
+                <a:lnSpc>
+                  <a:spcPct val="150000"/>
+                </a:lnSpc>
+              </a:pPr>
+              <a:r>
+                <a:rPr lang="en-IN" dirty="0">
+                  <a:latin typeface="Century Gothic" panose="020B0502020202020204" pitchFamily="34" charset="0"/>
+                </a:rPr>
+                <a:t>3. Can we get some certificates and create a fake SIP agent?</a:t>
+              </a:r>
+            </a:p>
+            <a:p>
+              <a:pPr>
+                <a:lnSpc>
+                  <a:spcPct val="150000"/>
+                </a:lnSpc>
+              </a:pPr>
+              <a:r>
+                <a:rPr lang="en-IN" dirty="0">
+                  <a:latin typeface="Century Gothic" panose="020B0502020202020204" pitchFamily="34" charset="0"/>
+                </a:rPr>
+                <a:t>4. What software version do the phones use (10.3 (1)) ?  Is </a:t>
+              </a:r>
+              <a:r>
+                <a:rPr lang="en-IN" dirty="0" err="1">
+                  <a:latin typeface="Century Gothic" panose="020B0502020202020204" pitchFamily="34" charset="0"/>
+                </a:rPr>
+                <a:t>libSRTP</a:t>
+              </a:r>
+              <a:r>
+                <a:rPr lang="en-IN" dirty="0">
+                  <a:latin typeface="Century Gothic" panose="020B0502020202020204" pitchFamily="34" charset="0"/>
+                </a:rPr>
+                <a:t> 1.5.3 ?</a:t>
+              </a:r>
+            </a:p>
+            <a:p>
+              <a:pPr>
+                <a:lnSpc>
+                  <a:spcPct val="150000"/>
+                </a:lnSpc>
+              </a:pPr>
+              <a:r>
+                <a:rPr lang="en-IN" dirty="0">
+                  <a:latin typeface="Century Gothic" panose="020B0502020202020204" pitchFamily="34" charset="0"/>
+                </a:rPr>
+                <a:t>5. How do we set-up the Jabber client (need help)?</a:t>
               </a:r>
             </a:p>
           </p:txBody>
         </p:sp>
-      </p:grpSp>
-      <p:sp>
-        <p:nvSpPr>
-          <p:cNvPr id="2" name="Title 1">
-            <a:extLst>
-              <a:ext uri="{FF2B5EF4-FFF2-40B4-BE49-F238E27FC236}">
-                <a16:creationId xmlns:a16="http://schemas.microsoft.com/office/drawing/2014/main" id="{F819E63E-530C-449E-AB16-6CDAB959E06D}"/>
-              </a:ext>
-            </a:extLst>
-          </p:cNvPr>
-          <p:cNvSpPr>
-            <a:spLocks noGrp="1"/>
-          </p:cNvSpPr>
-          <p:nvPr>
-            <p:ph type="title"/>
-          </p:nvPr>
-        </p:nvSpPr>
-        <p:spPr/>
-        <p:txBody>
-          <a:bodyPr/>
-          <a:lstStyle/>
-          <a:p>
-            <a:r>
-              <a:rPr lang="en-US" dirty="0"/>
-              <a:t>System Diagram</a:t>
-            </a:r>
-          </a:p>
-        </p:txBody>
-      </p:sp>
-      <p:grpSp>
-        <p:nvGrpSpPr>
-          <p:cNvPr id="24" name="Group 23">
-            <a:extLst>
-              <a:ext uri="{FF2B5EF4-FFF2-40B4-BE49-F238E27FC236}">
-                <a16:creationId xmlns:a16="http://schemas.microsoft.com/office/drawing/2014/main" id="{78D1483E-97F2-4731-8597-C2A12C8E16B1}"/>
-              </a:ext>
-            </a:extLst>
-          </p:cNvPr>
-          <p:cNvGrpSpPr/>
-          <p:nvPr/>
-        </p:nvGrpSpPr>
-        <p:grpSpPr>
-          <a:xfrm>
-            <a:off x="3820088" y="3680100"/>
-            <a:ext cx="1742513" cy="1299525"/>
-            <a:chOff x="3732868" y="3424875"/>
-            <a:chExt cx="1742513" cy="1299525"/>
-          </a:xfrm>
-        </p:grpSpPr>
-        <p:pic>
-          <p:nvPicPr>
-            <p:cNvPr id="23" name="Graphic 22" descr="Wireless router">
+        <p:sp>
+          <p:nvSpPr>
+            <p:cNvPr id="6" name="TextBox 5">
               <a:extLst>
                 <a:ext uri="{FF2B5EF4-FFF2-40B4-BE49-F238E27FC236}">
-                  <a16:creationId xmlns:a16="http://schemas.microsoft.com/office/drawing/2014/main" id="{A529D04E-F3E6-40ED-B966-306E2D044AA5}"/>
+                  <a16:creationId xmlns:a16="http://schemas.microsoft.com/office/drawing/2014/main" id="{02494360-1756-A648-9463-16C427498A90}"/>
                 </a:ext>
               </a:extLst>
             </p:cNvPr>
-            <p:cNvPicPr>
-              <a:picLocks noChangeAspect="1"/>
-            </p:cNvPicPr>
+            <p:cNvSpPr txBox="1"/>
             <p:nvPr/>
-          </p:nvPicPr>
-          <p:blipFill>
-            <a:blip r:embed="rId3">
-              <a:extLst>
-                <a:ext uri="{28A0092B-C50C-407E-A947-70E740481C1C}">
-                  <a14:useLocalDpi xmlns:a14="http://schemas.microsoft.com/office/drawing/2010/main" val="0"/>
-                </a:ext>
-                <a:ext uri="{96DAC541-7B7A-43D3-8B79-37D633B846F1}">
-                  <asvg:svgBlip xmlns:asvg="http://schemas.microsoft.com/office/drawing/2016/SVG/main" r:embed="rId4"/>
-                </a:ext>
-              </a:extLst>
-            </a:blip>
-            <a:stretch>
-              <a:fillRect/>
-            </a:stretch>
-          </p:blipFill>
+          </p:nvSpPr>
           <p:spPr>
             <a:xfrm>
-              <a:off x="4114800" y="3810000"/>
-              <a:ext cx="914400" cy="914400"/>
+              <a:off x="-723328" y="-336016"/>
+              <a:ext cx="5190067" cy="648842"/>
             </a:xfrm>
             <a:prstGeom prst="rect">
               <a:avLst/>
             </a:prstGeom>
+            <a:noFill/>
           </p:spPr>
-        </p:pic>
-        <p:sp>
-          <p:nvSpPr>
-            <p:cNvPr id="6" name="Rectangle 5">
-              <a:extLst>
-                <a:ext uri="{FF2B5EF4-FFF2-40B4-BE49-F238E27FC236}">
-                  <a16:creationId xmlns:a16="http://schemas.microsoft.com/office/drawing/2014/main" id="{3D04F8A0-26AC-4A65-BEF2-A22D913BF4E1}"/>
-                </a:ext>
-              </a:extLst>
-            </p:cNvPr>
-            <p:cNvSpPr/>
-            <p:nvPr/>
-          </p:nvSpPr>
-          <p:spPr>
-            <a:xfrm>
-              <a:off x="3732868" y="3424875"/>
-              <a:ext cx="1742513" cy="994725"/>
-            </a:xfrm>
-            <a:prstGeom prst="rect">
-              <a:avLst/>
-            </a:prstGeom>
-          </p:spPr>
-          <p:style>
-            <a:lnRef idx="2">
-              <a:schemeClr val="accent1">
-                <a:shade val="50000"/>
-              </a:schemeClr>
-            </a:lnRef>
-            <a:fillRef idx="1">
-              <a:schemeClr val="accent1"/>
-            </a:fillRef>
-            <a:effectRef idx="0">
-              <a:schemeClr val="accent1"/>
-            </a:effectRef>
-            <a:fontRef idx="minor">
-              <a:schemeClr val="lt1"/>
-            </a:fontRef>
-          </p:style>
           <p:txBody>
-            <a:bodyPr rtlCol="0" anchor="ctr"/>
+            <a:bodyPr wrap="square" rtlCol="0">
+              <a:spAutoFit/>
+            </a:bodyPr>
             <a:lstStyle/>
             <a:p>
               <a:pPr algn="ctr"/>
               <a:r>
-                <a:rPr lang="en-US" dirty="0" err="1"/>
-                <a:t>Netgear</a:t>
+                <a:rPr lang="en-US" sz="2400" b="1" i="1" dirty="0">
+                  <a:latin typeface="Century Gothic" panose="020B0502020202020204" pitchFamily="34" charset="0"/>
+                </a:rPr>
+                <a:t>Questions</a:t>
               </a:r>
-              <a:r>
-                <a:rPr lang="en-US" dirty="0"/>
-                <a:t> Switch</a:t>
-              </a:r>
+            </a:p>
+            <a:p>
+              <a:pPr algn="ctr"/>
+              <a:endParaRPr lang="en-US" sz="2400" b="1" i="1" dirty="0">
+                <a:latin typeface="Century Gothic" panose="020B0502020202020204" pitchFamily="34" charset="0"/>
+              </a:endParaRPr>
             </a:p>
           </p:txBody>
         </p:sp>
       </p:grpSp>
-      <p:sp>
-        <p:nvSpPr>
-          <p:cNvPr id="9" name="Cloud 8">
-            <a:extLst>
-              <a:ext uri="{FF2B5EF4-FFF2-40B4-BE49-F238E27FC236}">
-                <a16:creationId xmlns:a16="http://schemas.microsoft.com/office/drawing/2014/main" id="{38A7790E-A337-4B01-97BF-1E09319975BA}"/>
-              </a:ext>
-            </a:extLst>
-          </p:cNvPr>
-          <p:cNvSpPr/>
-          <p:nvPr/>
-        </p:nvSpPr>
-        <p:spPr>
-          <a:xfrm>
-            <a:off x="9519770" y="3429000"/>
-            <a:ext cx="2171700" cy="1295400"/>
-          </a:xfrm>
-          <a:prstGeom prst="cloud">
-            <a:avLst/>
-          </a:prstGeom>
-        </p:spPr>
-        <p:style>
-          <a:lnRef idx="2">
-            <a:schemeClr val="accent1">
-              <a:shade val="50000"/>
-            </a:schemeClr>
-          </a:lnRef>
-          <a:fillRef idx="1">
-            <a:schemeClr val="accent1"/>
-          </a:fillRef>
-          <a:effectRef idx="0">
-            <a:schemeClr val="accent1"/>
-          </a:effectRef>
-          <a:fontRef idx="minor">
-            <a:schemeClr val="lt1"/>
-          </a:fontRef>
-        </p:style>
-        <p:txBody>
-          <a:bodyPr rtlCol="0" anchor="ctr"/>
-          <a:lstStyle/>
-          <a:p>
-            <a:pPr algn="ctr"/>
-            <a:r>
-              <a:rPr lang="en-US" dirty="0"/>
-              <a:t>UC Davis VoIP WLAN</a:t>
-            </a:r>
-          </a:p>
-          <a:p>
-            <a:pPr algn="ctr"/>
-            <a:endParaRPr lang="en-US" dirty="0"/>
-          </a:p>
-        </p:txBody>
-      </p:sp>
-      <p:grpSp>
-        <p:nvGrpSpPr>
-          <p:cNvPr id="14" name="Group 13">
-            <a:extLst>
-              <a:ext uri="{FF2B5EF4-FFF2-40B4-BE49-F238E27FC236}">
-                <a16:creationId xmlns:a16="http://schemas.microsoft.com/office/drawing/2014/main" id="{49FF96DF-F739-4EEB-B773-0F1EB1F56AB7}"/>
-              </a:ext>
-            </a:extLst>
-          </p:cNvPr>
-          <p:cNvGrpSpPr/>
-          <p:nvPr/>
-        </p:nvGrpSpPr>
-        <p:grpSpPr>
-          <a:xfrm>
-            <a:off x="1498975" y="2057400"/>
-            <a:ext cx="1174376" cy="1566193"/>
-            <a:chOff x="1355912" y="1720719"/>
-            <a:chExt cx="1174376" cy="1566193"/>
-          </a:xfrm>
-        </p:grpSpPr>
-        <p:sp>
-          <p:nvSpPr>
-            <p:cNvPr id="3" name="Rectangle 2">
-              <a:extLst>
-                <a:ext uri="{FF2B5EF4-FFF2-40B4-BE49-F238E27FC236}">
-                  <a16:creationId xmlns:a16="http://schemas.microsoft.com/office/drawing/2014/main" id="{1561D112-DECB-4165-844C-0B9A6B5816F9}"/>
-                </a:ext>
-              </a:extLst>
-            </p:cNvPr>
-            <p:cNvSpPr/>
-            <p:nvPr/>
-          </p:nvSpPr>
-          <p:spPr>
-            <a:xfrm>
-              <a:off x="1355912" y="1720719"/>
-              <a:ext cx="1174376" cy="1197238"/>
-            </a:xfrm>
-            <a:prstGeom prst="rect">
-              <a:avLst/>
-            </a:prstGeom>
-          </p:spPr>
-          <p:style>
-            <a:lnRef idx="2">
-              <a:schemeClr val="accent1">
-                <a:shade val="50000"/>
-              </a:schemeClr>
-            </a:lnRef>
-            <a:fillRef idx="1">
-              <a:schemeClr val="accent1"/>
-            </a:fillRef>
-            <a:effectRef idx="0">
-              <a:schemeClr val="accent1"/>
-            </a:effectRef>
-            <a:fontRef idx="minor">
-              <a:schemeClr val="lt1"/>
-            </a:fontRef>
-          </p:style>
-          <p:txBody>
-            <a:bodyPr rtlCol="0" anchor="ctr"/>
-            <a:lstStyle/>
-            <a:p>
-              <a:pPr algn="ctr"/>
-              <a:r>
-                <a:rPr lang="en-US" dirty="0"/>
-                <a:t>Cisco Phone</a:t>
-              </a:r>
-            </a:p>
-          </p:txBody>
-        </p:sp>
-        <p:pic>
-          <p:nvPicPr>
-            <p:cNvPr id="11" name="Graphic 10" descr="Telephone">
-              <a:extLst>
-                <a:ext uri="{FF2B5EF4-FFF2-40B4-BE49-F238E27FC236}">
-                  <a16:creationId xmlns:a16="http://schemas.microsoft.com/office/drawing/2014/main" id="{E4D2B0E5-CDF4-4CAE-AA8C-5825739BDB85}"/>
-                </a:ext>
-              </a:extLst>
-            </p:cNvPr>
-            <p:cNvPicPr>
-              <a:picLocks noChangeAspect="1"/>
-            </p:cNvPicPr>
-            <p:nvPr/>
-          </p:nvPicPr>
-          <p:blipFill>
-            <a:blip r:embed="rId5">
-              <a:extLst>
-                <a:ext uri="{28A0092B-C50C-407E-A947-70E740481C1C}">
-                  <a14:useLocalDpi xmlns:a14="http://schemas.microsoft.com/office/drawing/2010/main" val="0"/>
-                </a:ext>
-                <a:ext uri="{96DAC541-7B7A-43D3-8B79-37D633B846F1}">
-                  <asvg:svgBlip xmlns:asvg="http://schemas.microsoft.com/office/drawing/2016/SVG/main" r:embed="rId6"/>
-                </a:ext>
-              </a:extLst>
-            </a:blip>
-            <a:stretch>
-              <a:fillRect/>
-            </a:stretch>
-          </p:blipFill>
-          <p:spPr>
-            <a:xfrm>
-              <a:off x="1485900" y="2372512"/>
-              <a:ext cx="914400" cy="914400"/>
-            </a:xfrm>
-            <a:prstGeom prst="rect">
-              <a:avLst/>
-            </a:prstGeom>
-          </p:spPr>
-        </p:pic>
-      </p:grpSp>
-      <p:grpSp>
-        <p:nvGrpSpPr>
-          <p:cNvPr id="16" name="Group 15">
-            <a:extLst>
-              <a:ext uri="{FF2B5EF4-FFF2-40B4-BE49-F238E27FC236}">
-                <a16:creationId xmlns:a16="http://schemas.microsoft.com/office/drawing/2014/main" id="{BBAC6C51-8817-41B6-A3A6-C58FDC9A3270}"/>
-              </a:ext>
-            </a:extLst>
-          </p:cNvPr>
-          <p:cNvGrpSpPr/>
-          <p:nvPr/>
-        </p:nvGrpSpPr>
-        <p:grpSpPr>
-          <a:xfrm>
-            <a:off x="1486649" y="3810000"/>
-            <a:ext cx="1174376" cy="1566193"/>
-            <a:chOff x="1355912" y="1720719"/>
-            <a:chExt cx="1174376" cy="1566193"/>
-          </a:xfrm>
-        </p:grpSpPr>
-        <p:sp>
-          <p:nvSpPr>
-            <p:cNvPr id="17" name="Rectangle 16">
-              <a:extLst>
-                <a:ext uri="{FF2B5EF4-FFF2-40B4-BE49-F238E27FC236}">
-                  <a16:creationId xmlns:a16="http://schemas.microsoft.com/office/drawing/2014/main" id="{AC8EDCF6-0485-4A54-93FC-6F6937BD9F70}"/>
-                </a:ext>
-              </a:extLst>
-            </p:cNvPr>
-            <p:cNvSpPr/>
-            <p:nvPr/>
-          </p:nvSpPr>
-          <p:spPr>
-            <a:xfrm>
-              <a:off x="1355912" y="1720719"/>
-              <a:ext cx="1174376" cy="1197238"/>
-            </a:xfrm>
-            <a:prstGeom prst="rect">
-              <a:avLst/>
-            </a:prstGeom>
-          </p:spPr>
-          <p:style>
-            <a:lnRef idx="2">
-              <a:schemeClr val="accent1">
-                <a:shade val="50000"/>
-              </a:schemeClr>
-            </a:lnRef>
-            <a:fillRef idx="1">
-              <a:schemeClr val="accent1"/>
-            </a:fillRef>
-            <a:effectRef idx="0">
-              <a:schemeClr val="accent1"/>
-            </a:effectRef>
-            <a:fontRef idx="minor">
-              <a:schemeClr val="lt1"/>
-            </a:fontRef>
-          </p:style>
-          <p:txBody>
-            <a:bodyPr rtlCol="0" anchor="ctr"/>
-            <a:lstStyle/>
-            <a:p>
-              <a:pPr algn="ctr"/>
-              <a:r>
-                <a:rPr lang="en-US" dirty="0"/>
-                <a:t>Cisco Phone</a:t>
-              </a:r>
-            </a:p>
-          </p:txBody>
-        </p:sp>
-        <p:pic>
-          <p:nvPicPr>
-            <p:cNvPr id="18" name="Graphic 17" descr="Telephone">
-              <a:extLst>
-                <a:ext uri="{FF2B5EF4-FFF2-40B4-BE49-F238E27FC236}">
-                  <a16:creationId xmlns:a16="http://schemas.microsoft.com/office/drawing/2014/main" id="{F4932AC9-1790-4AA5-AE9B-EC94003778CF}"/>
-                </a:ext>
-              </a:extLst>
-            </p:cNvPr>
-            <p:cNvPicPr>
-              <a:picLocks noChangeAspect="1"/>
-            </p:cNvPicPr>
-            <p:nvPr/>
-          </p:nvPicPr>
-          <p:blipFill>
-            <a:blip r:embed="rId5">
-              <a:extLst>
-                <a:ext uri="{28A0092B-C50C-407E-A947-70E740481C1C}">
-                  <a14:useLocalDpi xmlns:a14="http://schemas.microsoft.com/office/drawing/2010/main" val="0"/>
-                </a:ext>
-                <a:ext uri="{96DAC541-7B7A-43D3-8B79-37D633B846F1}">
-                  <asvg:svgBlip xmlns:asvg="http://schemas.microsoft.com/office/drawing/2016/SVG/main" r:embed="rId6"/>
-                </a:ext>
-              </a:extLst>
-            </a:blip>
-            <a:stretch>
-              <a:fillRect/>
-            </a:stretch>
-          </p:blipFill>
-          <p:spPr>
-            <a:xfrm>
-              <a:off x="1485900" y="2372512"/>
-              <a:ext cx="914400" cy="914400"/>
-            </a:xfrm>
-            <a:prstGeom prst="rect">
-              <a:avLst/>
-            </a:prstGeom>
-          </p:spPr>
-        </p:pic>
-      </p:grpSp>
-      <p:grpSp>
-        <p:nvGrpSpPr>
-          <p:cNvPr id="19" name="Group 18">
-            <a:extLst>
-              <a:ext uri="{FF2B5EF4-FFF2-40B4-BE49-F238E27FC236}">
-                <a16:creationId xmlns:a16="http://schemas.microsoft.com/office/drawing/2014/main" id="{942A71B4-15E8-4289-98C2-186ED60AD6E0}"/>
-              </a:ext>
-            </a:extLst>
-          </p:cNvPr>
-          <p:cNvGrpSpPr/>
-          <p:nvPr/>
-        </p:nvGrpSpPr>
-        <p:grpSpPr>
-          <a:xfrm>
-            <a:off x="1498975" y="5376938"/>
-            <a:ext cx="1174376" cy="1566193"/>
-            <a:chOff x="1355912" y="1720719"/>
-            <a:chExt cx="1174376" cy="1566193"/>
-          </a:xfrm>
-        </p:grpSpPr>
-        <p:sp>
-          <p:nvSpPr>
-            <p:cNvPr id="20" name="Rectangle 19">
-              <a:extLst>
-                <a:ext uri="{FF2B5EF4-FFF2-40B4-BE49-F238E27FC236}">
-                  <a16:creationId xmlns:a16="http://schemas.microsoft.com/office/drawing/2014/main" id="{8731AB63-20E1-4D10-A5E0-E08BAEA930A0}"/>
-                </a:ext>
-              </a:extLst>
-            </p:cNvPr>
-            <p:cNvSpPr/>
-            <p:nvPr/>
-          </p:nvSpPr>
-          <p:spPr>
-            <a:xfrm>
-              <a:off x="1355912" y="1720719"/>
-              <a:ext cx="1174376" cy="1197238"/>
-            </a:xfrm>
-            <a:prstGeom prst="rect">
-              <a:avLst/>
-            </a:prstGeom>
-          </p:spPr>
-          <p:style>
-            <a:lnRef idx="2">
-              <a:schemeClr val="accent1">
-                <a:shade val="50000"/>
-              </a:schemeClr>
-            </a:lnRef>
-            <a:fillRef idx="1">
-              <a:schemeClr val="accent1"/>
-            </a:fillRef>
-            <a:effectRef idx="0">
-              <a:schemeClr val="accent1"/>
-            </a:effectRef>
-            <a:fontRef idx="minor">
-              <a:schemeClr val="lt1"/>
-            </a:fontRef>
-          </p:style>
-          <p:txBody>
-            <a:bodyPr rtlCol="0" anchor="ctr"/>
-            <a:lstStyle/>
-            <a:p>
-              <a:pPr algn="ctr"/>
-              <a:r>
-                <a:rPr lang="en-US" dirty="0"/>
-                <a:t>Cisco Phone</a:t>
-              </a:r>
-            </a:p>
-          </p:txBody>
-        </p:sp>
-        <p:pic>
-          <p:nvPicPr>
-            <p:cNvPr id="21" name="Graphic 20" descr="Telephone">
-              <a:extLst>
-                <a:ext uri="{FF2B5EF4-FFF2-40B4-BE49-F238E27FC236}">
-                  <a16:creationId xmlns:a16="http://schemas.microsoft.com/office/drawing/2014/main" id="{AAA545D3-D127-4228-8CE3-63E6EC1C7D06}"/>
-                </a:ext>
-              </a:extLst>
-            </p:cNvPr>
-            <p:cNvPicPr>
-              <a:picLocks noChangeAspect="1"/>
-            </p:cNvPicPr>
-            <p:nvPr/>
-          </p:nvPicPr>
-          <p:blipFill>
-            <a:blip r:embed="rId5">
-              <a:extLst>
-                <a:ext uri="{28A0092B-C50C-407E-A947-70E740481C1C}">
-                  <a14:useLocalDpi xmlns:a14="http://schemas.microsoft.com/office/drawing/2010/main" val="0"/>
-                </a:ext>
-                <a:ext uri="{96DAC541-7B7A-43D3-8B79-37D633B846F1}">
-                  <asvg:svgBlip xmlns:asvg="http://schemas.microsoft.com/office/drawing/2016/SVG/main" r:embed="rId6"/>
-                </a:ext>
-              </a:extLst>
-            </a:blip>
-            <a:stretch>
-              <a:fillRect/>
-            </a:stretch>
-          </p:blipFill>
-          <p:spPr>
-            <a:xfrm>
-              <a:off x="1485900" y="2372512"/>
-              <a:ext cx="914400" cy="914400"/>
-            </a:xfrm>
-            <a:prstGeom prst="rect">
-              <a:avLst/>
-            </a:prstGeom>
-          </p:spPr>
-        </p:pic>
-      </p:grpSp>
-      <p:cxnSp>
-        <p:nvCxnSpPr>
-          <p:cNvPr id="32" name="Connector: Curved 31">
-            <a:extLst>
-              <a:ext uri="{FF2B5EF4-FFF2-40B4-BE49-F238E27FC236}">
-                <a16:creationId xmlns:a16="http://schemas.microsoft.com/office/drawing/2014/main" id="{AC3E63F1-E164-4469-99BE-56B1EA75CBCE}"/>
-              </a:ext>
-            </a:extLst>
-          </p:cNvPr>
-          <p:cNvCxnSpPr>
-            <a:cxnSpLocks/>
-            <a:endCxn id="6" idx="1"/>
-          </p:cNvCxnSpPr>
-          <p:nvPr/>
-        </p:nvCxnSpPr>
-        <p:spPr>
-          <a:xfrm flipV="1">
-            <a:off x="2362200" y="4177463"/>
-            <a:ext cx="1457888" cy="866597"/>
-          </a:xfrm>
-          <a:prstGeom prst="curvedConnector3">
-            <a:avLst/>
-          </a:prstGeom>
-        </p:spPr>
-        <p:style>
-          <a:lnRef idx="1">
-            <a:schemeClr val="accent1"/>
-          </a:lnRef>
-          <a:fillRef idx="0">
-            <a:schemeClr val="accent1"/>
-          </a:fillRef>
-          <a:effectRef idx="0">
-            <a:schemeClr val="accent1"/>
-          </a:effectRef>
-          <a:fontRef idx="minor">
-            <a:schemeClr val="tx1"/>
-          </a:fontRef>
-        </p:style>
-      </p:cxnSp>
-      <p:cxnSp>
-        <p:nvCxnSpPr>
-          <p:cNvPr id="36" name="Connector: Curved 35">
-            <a:extLst>
-              <a:ext uri="{FF2B5EF4-FFF2-40B4-BE49-F238E27FC236}">
-                <a16:creationId xmlns:a16="http://schemas.microsoft.com/office/drawing/2014/main" id="{55A9D18A-B33E-4BA0-BE17-49D76FBE8AA3}"/>
-              </a:ext>
-            </a:extLst>
-          </p:cNvPr>
-          <p:cNvCxnSpPr>
-            <a:cxnSpLocks/>
-            <a:endCxn id="6" idx="1"/>
-          </p:cNvCxnSpPr>
-          <p:nvPr/>
-        </p:nvCxnSpPr>
-        <p:spPr>
-          <a:xfrm>
-            <a:off x="2263498" y="3429000"/>
-            <a:ext cx="1556590" cy="748463"/>
-          </a:xfrm>
-          <a:prstGeom prst="curvedConnector3">
-            <a:avLst/>
-          </a:prstGeom>
-        </p:spPr>
-        <p:style>
-          <a:lnRef idx="1">
-            <a:schemeClr val="accent1"/>
-          </a:lnRef>
-          <a:fillRef idx="0">
-            <a:schemeClr val="accent1"/>
-          </a:fillRef>
-          <a:effectRef idx="0">
-            <a:schemeClr val="accent1"/>
-          </a:effectRef>
-          <a:fontRef idx="minor">
-            <a:schemeClr val="tx1"/>
-          </a:fontRef>
-        </p:style>
-      </p:cxnSp>
-      <p:cxnSp>
-        <p:nvCxnSpPr>
-          <p:cNvPr id="44" name="Connector: Curved 43">
-            <a:extLst>
-              <a:ext uri="{FF2B5EF4-FFF2-40B4-BE49-F238E27FC236}">
-                <a16:creationId xmlns:a16="http://schemas.microsoft.com/office/drawing/2014/main" id="{12AF6C68-40CE-4778-858D-1F9F1E4A8DE5}"/>
-              </a:ext>
-            </a:extLst>
-          </p:cNvPr>
-          <p:cNvCxnSpPr>
-            <a:cxnSpLocks/>
-            <a:endCxn id="7" idx="1"/>
-          </p:cNvCxnSpPr>
-          <p:nvPr/>
-        </p:nvCxnSpPr>
-        <p:spPr>
-          <a:xfrm flipV="1">
-            <a:off x="5574884" y="4094257"/>
-            <a:ext cx="870814" cy="249143"/>
-          </a:xfrm>
-          <a:prstGeom prst="curvedConnector3">
-            <a:avLst/>
-          </a:prstGeom>
-        </p:spPr>
-        <p:style>
-          <a:lnRef idx="1">
-            <a:schemeClr val="accent1"/>
-          </a:lnRef>
-          <a:fillRef idx="0">
-            <a:schemeClr val="accent1"/>
-          </a:fillRef>
-          <a:effectRef idx="0">
-            <a:schemeClr val="accent1"/>
-          </a:effectRef>
-          <a:fontRef idx="minor">
-            <a:schemeClr val="tx1"/>
-          </a:fontRef>
-        </p:style>
-      </p:cxnSp>
-      <p:cxnSp>
-        <p:nvCxnSpPr>
-          <p:cNvPr id="46" name="Connector: Curved 45">
-            <a:extLst>
-              <a:ext uri="{FF2B5EF4-FFF2-40B4-BE49-F238E27FC236}">
-                <a16:creationId xmlns:a16="http://schemas.microsoft.com/office/drawing/2014/main" id="{5619E92C-934A-4E53-B76A-F13ABF94FF45}"/>
-              </a:ext>
-            </a:extLst>
-          </p:cNvPr>
-          <p:cNvCxnSpPr>
-            <a:cxnSpLocks/>
-            <a:endCxn id="9" idx="2"/>
-          </p:cNvCxnSpPr>
-          <p:nvPr/>
-        </p:nvCxnSpPr>
-        <p:spPr>
-          <a:xfrm flipV="1">
-            <a:off x="8591581" y="4076700"/>
-            <a:ext cx="934925" cy="190500"/>
-          </a:xfrm>
-          <a:prstGeom prst="curvedConnector3">
-            <a:avLst/>
-          </a:prstGeom>
-        </p:spPr>
-        <p:style>
-          <a:lnRef idx="1">
-            <a:schemeClr val="accent1"/>
-          </a:lnRef>
-          <a:fillRef idx="0">
-            <a:schemeClr val="accent1"/>
-          </a:fillRef>
-          <a:effectRef idx="0">
-            <a:schemeClr val="accent1"/>
-          </a:effectRef>
-          <a:fontRef idx="minor">
-            <a:schemeClr val="tx1"/>
-          </a:fontRef>
-        </p:style>
-      </p:cxnSp>
-      <p:grpSp>
-        <p:nvGrpSpPr>
-          <p:cNvPr id="54" name="Group 53">
-            <a:extLst>
-              <a:ext uri="{FF2B5EF4-FFF2-40B4-BE49-F238E27FC236}">
-                <a16:creationId xmlns:a16="http://schemas.microsoft.com/office/drawing/2014/main" id="{86FE305F-EF92-4D77-9E7B-DCE10AE2D47B}"/>
-              </a:ext>
-            </a:extLst>
-          </p:cNvPr>
-          <p:cNvGrpSpPr/>
-          <p:nvPr/>
-        </p:nvGrpSpPr>
-        <p:grpSpPr>
-          <a:xfrm>
-            <a:off x="3733800" y="2169166"/>
-            <a:ext cx="2069684" cy="936210"/>
-            <a:chOff x="3733800" y="1694343"/>
-            <a:chExt cx="2069684" cy="936210"/>
-          </a:xfrm>
-        </p:grpSpPr>
-        <p:sp>
-          <p:nvSpPr>
-            <p:cNvPr id="53" name="Rectangle 52">
-              <a:extLst>
-                <a:ext uri="{FF2B5EF4-FFF2-40B4-BE49-F238E27FC236}">
-                  <a16:creationId xmlns:a16="http://schemas.microsoft.com/office/drawing/2014/main" id="{CE88398D-EC54-47C6-AC73-C1C7A7A5721A}"/>
-                </a:ext>
-              </a:extLst>
-            </p:cNvPr>
-            <p:cNvSpPr/>
-            <p:nvPr/>
-          </p:nvSpPr>
-          <p:spPr>
-            <a:xfrm>
-              <a:off x="3733800" y="1694343"/>
-              <a:ext cx="2069684" cy="858743"/>
-            </a:xfrm>
-            <a:prstGeom prst="rect">
-              <a:avLst/>
-            </a:prstGeom>
-          </p:spPr>
-          <p:style>
-            <a:lnRef idx="2">
-              <a:schemeClr val="accent1">
-                <a:shade val="50000"/>
-              </a:schemeClr>
-            </a:lnRef>
-            <a:fillRef idx="1">
-              <a:schemeClr val="accent1"/>
-            </a:fillRef>
-            <a:effectRef idx="0">
-              <a:schemeClr val="accent1"/>
-            </a:effectRef>
-            <a:fontRef idx="minor">
-              <a:schemeClr val="lt1"/>
-            </a:fontRef>
-          </p:style>
-          <p:txBody>
-            <a:bodyPr rtlCol="0" anchor="ctr"/>
-            <a:lstStyle/>
-            <a:p>
-              <a:r>
-                <a:rPr lang="en-US" dirty="0"/>
-                <a:t>Computer</a:t>
-              </a:r>
-            </a:p>
-          </p:txBody>
-        </p:sp>
-        <p:pic>
-          <p:nvPicPr>
-            <p:cNvPr id="52" name="Graphic 51" descr="Monitor">
-              <a:extLst>
-                <a:ext uri="{FF2B5EF4-FFF2-40B4-BE49-F238E27FC236}">
-                  <a16:creationId xmlns:a16="http://schemas.microsoft.com/office/drawing/2014/main" id="{2C56325C-5927-4A08-AF20-D3F21B2029F0}"/>
-                </a:ext>
-              </a:extLst>
-            </p:cNvPr>
-            <p:cNvPicPr>
-              <a:picLocks noChangeAspect="1"/>
-            </p:cNvPicPr>
-            <p:nvPr/>
-          </p:nvPicPr>
-          <p:blipFill>
-            <a:blip r:embed="rId7">
-              <a:extLst>
-                <a:ext uri="{28A0092B-C50C-407E-A947-70E740481C1C}">
-                  <a14:useLocalDpi xmlns:a14="http://schemas.microsoft.com/office/drawing/2010/main" val="0"/>
-                </a:ext>
-                <a:ext uri="{96DAC541-7B7A-43D3-8B79-37D633B846F1}">
-                  <asvg:svgBlip xmlns:asvg="http://schemas.microsoft.com/office/drawing/2016/SVG/main" r:embed="rId8"/>
-                </a:ext>
-              </a:extLst>
-            </a:blip>
-            <a:stretch>
-              <a:fillRect/>
-            </a:stretch>
-          </p:blipFill>
-          <p:spPr>
-            <a:xfrm>
-              <a:off x="4800600" y="1716153"/>
-              <a:ext cx="888834" cy="914400"/>
-            </a:xfrm>
-            <a:prstGeom prst="rect">
-              <a:avLst/>
-            </a:prstGeom>
-          </p:spPr>
-        </p:pic>
-      </p:grpSp>
-      <p:cxnSp>
-        <p:nvCxnSpPr>
-          <p:cNvPr id="65" name="Connector: Curved 64">
-            <a:extLst>
-              <a:ext uri="{FF2B5EF4-FFF2-40B4-BE49-F238E27FC236}">
-                <a16:creationId xmlns:a16="http://schemas.microsoft.com/office/drawing/2014/main" id="{94252763-D616-4639-9D7E-ED0AD70818F5}"/>
-              </a:ext>
-            </a:extLst>
-          </p:cNvPr>
-          <p:cNvCxnSpPr/>
-          <p:nvPr/>
-        </p:nvCxnSpPr>
-        <p:spPr>
-          <a:xfrm rot="5400000" flipH="1" flipV="1">
-            <a:off x="1871944" y="4757456"/>
-            <a:ext cx="2438400" cy="1457888"/>
-          </a:xfrm>
-          <a:prstGeom prst="curvedConnector3">
-            <a:avLst/>
-          </a:prstGeom>
-        </p:spPr>
-        <p:style>
-          <a:lnRef idx="1">
-            <a:schemeClr val="accent1"/>
-          </a:lnRef>
-          <a:fillRef idx="0">
-            <a:schemeClr val="accent1"/>
-          </a:fillRef>
-          <a:effectRef idx="0">
-            <a:schemeClr val="accent1"/>
-          </a:effectRef>
-          <a:fontRef idx="minor">
-            <a:schemeClr val="tx1"/>
-          </a:fontRef>
-        </p:style>
-      </p:cxnSp>
-      <p:cxnSp>
-        <p:nvCxnSpPr>
-          <p:cNvPr id="56" name="Connector: Curved 55">
-            <a:extLst>
-              <a:ext uri="{FF2B5EF4-FFF2-40B4-BE49-F238E27FC236}">
-                <a16:creationId xmlns:a16="http://schemas.microsoft.com/office/drawing/2014/main" id="{53AF2A81-BA5E-49C1-BB38-FF5599DEF1AB}"/>
-              </a:ext>
-            </a:extLst>
-          </p:cNvPr>
-          <p:cNvCxnSpPr>
-            <a:cxnSpLocks/>
-          </p:cNvCxnSpPr>
-          <p:nvPr/>
-        </p:nvCxnSpPr>
-        <p:spPr>
-          <a:xfrm rot="5400000">
-            <a:off x="4617775" y="3031174"/>
-            <a:ext cx="680081" cy="574405"/>
-          </a:xfrm>
-          <a:prstGeom prst="curvedConnector3">
-            <a:avLst>
-              <a:gd name="adj1" fmla="val 50000"/>
-            </a:avLst>
-          </a:prstGeom>
-        </p:spPr>
-        <p:style>
-          <a:lnRef idx="1">
-            <a:schemeClr val="accent1"/>
-          </a:lnRef>
-          <a:fillRef idx="0">
-            <a:schemeClr val="accent1"/>
-          </a:fillRef>
-          <a:effectRef idx="0">
-            <a:schemeClr val="accent1"/>
-          </a:effectRef>
-          <a:fontRef idx="minor">
-            <a:schemeClr val="tx1"/>
-          </a:fontRef>
-        </p:style>
-      </p:cxnSp>
     </p:spTree>
     <p:extLst>
       <p:ext uri="{BB962C8B-B14F-4D97-AF65-F5344CB8AC3E}">
-        <p14:creationId xmlns:p14="http://schemas.microsoft.com/office/powerpoint/2010/main" val="3961494294"/>
+        <p14:creationId xmlns:p14="http://schemas.microsoft.com/office/powerpoint/2010/main" val="1630351627"/>
       </p:ext>
     </p:extLst>
   </p:cSld>

</xml_diff>